<commit_message>
foresight in my work (1.1 v)
</commit_message>
<xml_diff>
--- a/Foresight_in_work/Foresight_methodologies.pptx
+++ b/Foresight_in_work/Foresight_methodologies.pptx
@@ -7,12 +7,13 @@
   <p:sldIdLst>
     <p:sldId id="256" r:id="rId2"/>
     <p:sldId id="259" r:id="rId3"/>
-    <p:sldId id="260" r:id="rId4"/>
-    <p:sldId id="261" r:id="rId5"/>
-    <p:sldId id="262" r:id="rId6"/>
-    <p:sldId id="263" r:id="rId7"/>
-    <p:sldId id="264" r:id="rId8"/>
-    <p:sldId id="265" r:id="rId9"/>
+    <p:sldId id="266" r:id="rId4"/>
+    <p:sldId id="260" r:id="rId5"/>
+    <p:sldId id="261" r:id="rId6"/>
+    <p:sldId id="262" r:id="rId7"/>
+    <p:sldId id="263" r:id="rId8"/>
+    <p:sldId id="264" r:id="rId9"/>
+    <p:sldId id="265" r:id="rId10"/>
   </p:sldIdLst>
   <p:sldSz cx="12192000" cy="6858000"/>
   <p:notesSz cx="6858000" cy="9144000"/>
@@ -111,6 +112,22 @@
       </a:defRPr>
     </a:lvl9pPr>
   </p:defaultTextStyle>
+  <p:extLst>
+    <p:ext uri="{EFAFB233-063F-42B5-8137-9DF3F51BA10A}">
+      <p15:sldGuideLst xmlns:p15="http://schemas.microsoft.com/office/powerpoint/2012/main">
+        <p15:guide id="1" orient="horz" pos="2160">
+          <p15:clr>
+            <a:srgbClr val="A4A3A4"/>
+          </p15:clr>
+        </p15:guide>
+        <p15:guide id="2" pos="3840">
+          <p15:clr>
+            <a:srgbClr val="A4A3A4"/>
+          </p15:clr>
+        </p15:guide>
+      </p15:sldGuideLst>
+    </p:ext>
+  </p:extLst>
 </p:presentation>
 </file>
 
@@ -836,7 +853,7 @@
           <a:p>
             <a:fld id="{252F7152-2E34-4CF8-96E1-9C0B6BE1AFF1}" type="datetimeFigureOut">
               <a:rPr lang="ru-RU" smtClean="0"/>
-              <a:t>12.04.2015</a:t>
+              <a:t>13.04.2015</a:t>
             </a:fld>
             <a:endParaRPr lang="ru-RU"/>
           </a:p>
@@ -1087,7 +1104,7 @@
           <a:p>
             <a:fld id="{252F7152-2E34-4CF8-96E1-9C0B6BE1AFF1}" type="datetimeFigureOut">
               <a:rPr lang="ru-RU" smtClean="0"/>
-              <a:t>12.04.2015</a:t>
+              <a:t>13.04.2015</a:t>
             </a:fld>
             <a:endParaRPr lang="ru-RU"/>
           </a:p>
@@ -1401,7 +1418,7 @@
           <a:p>
             <a:fld id="{252F7152-2E34-4CF8-96E1-9C0B6BE1AFF1}" type="datetimeFigureOut">
               <a:rPr lang="ru-RU" smtClean="0"/>
-              <a:t>12.04.2015</a:t>
+              <a:t>13.04.2015</a:t>
             </a:fld>
             <a:endParaRPr lang="ru-RU"/>
           </a:p>
@@ -1742,7 +1759,7 @@
           <a:p>
             <a:fld id="{252F7152-2E34-4CF8-96E1-9C0B6BE1AFF1}" type="datetimeFigureOut">
               <a:rPr lang="ru-RU" smtClean="0"/>
-              <a:t>12.04.2015</a:t>
+              <a:t>13.04.2015</a:t>
             </a:fld>
             <a:endParaRPr lang="ru-RU"/>
           </a:p>
@@ -2056,7 +2073,7 @@
           <a:p>
             <a:fld id="{252F7152-2E34-4CF8-96E1-9C0B6BE1AFF1}" type="datetimeFigureOut">
               <a:rPr lang="ru-RU" smtClean="0"/>
-              <a:t>12.04.2015</a:t>
+              <a:t>13.04.2015</a:t>
             </a:fld>
             <a:endParaRPr lang="ru-RU"/>
           </a:p>
@@ -2449,7 +2466,7 @@
           <a:p>
             <a:fld id="{252F7152-2E34-4CF8-96E1-9C0B6BE1AFF1}" type="datetimeFigureOut">
               <a:rPr lang="ru-RU" smtClean="0"/>
-              <a:t>12.04.2015</a:t>
+              <a:t>13.04.2015</a:t>
             </a:fld>
             <a:endParaRPr lang="ru-RU"/>
           </a:p>
@@ -2619,7 +2636,7 @@
           <a:p>
             <a:fld id="{252F7152-2E34-4CF8-96E1-9C0B6BE1AFF1}" type="datetimeFigureOut">
               <a:rPr lang="ru-RU" smtClean="0"/>
-              <a:t>12.04.2015</a:t>
+              <a:t>13.04.2015</a:t>
             </a:fld>
             <a:endParaRPr lang="ru-RU"/>
           </a:p>
@@ -2799,7 +2816,7 @@
           <a:p>
             <a:fld id="{252F7152-2E34-4CF8-96E1-9C0B6BE1AFF1}" type="datetimeFigureOut">
               <a:rPr lang="ru-RU" smtClean="0"/>
-              <a:t>12.04.2015</a:t>
+              <a:t>13.04.2015</a:t>
             </a:fld>
             <a:endParaRPr lang="ru-RU"/>
           </a:p>
@@ -2975,7 +2992,7 @@
           <a:p>
             <a:fld id="{252F7152-2E34-4CF8-96E1-9C0B6BE1AFF1}" type="datetimeFigureOut">
               <a:rPr lang="ru-RU" smtClean="0"/>
-              <a:t>12.04.2015</a:t>
+              <a:t>13.04.2015</a:t>
             </a:fld>
             <a:endParaRPr lang="ru-RU"/>
           </a:p>
@@ -3222,7 +3239,7 @@
           <a:p>
             <a:fld id="{252F7152-2E34-4CF8-96E1-9C0B6BE1AFF1}" type="datetimeFigureOut">
               <a:rPr lang="ru-RU" smtClean="0"/>
-              <a:t>12.04.2015</a:t>
+              <a:t>13.04.2015</a:t>
             </a:fld>
             <a:endParaRPr lang="ru-RU"/>
           </a:p>
@@ -3454,7 +3471,7 @@
           <a:p>
             <a:fld id="{252F7152-2E34-4CF8-96E1-9C0B6BE1AFF1}" type="datetimeFigureOut">
               <a:rPr lang="ru-RU" smtClean="0"/>
-              <a:t>12.04.2015</a:t>
+              <a:t>13.04.2015</a:t>
             </a:fld>
             <a:endParaRPr lang="ru-RU"/>
           </a:p>
@@ -3828,7 +3845,7 @@
           <a:p>
             <a:fld id="{252F7152-2E34-4CF8-96E1-9C0B6BE1AFF1}" type="datetimeFigureOut">
               <a:rPr lang="ru-RU" smtClean="0"/>
-              <a:t>12.04.2015</a:t>
+              <a:t>13.04.2015</a:t>
             </a:fld>
             <a:endParaRPr lang="ru-RU"/>
           </a:p>
@@ -3951,7 +3968,7 @@
           <a:p>
             <a:fld id="{252F7152-2E34-4CF8-96E1-9C0B6BE1AFF1}" type="datetimeFigureOut">
               <a:rPr lang="ru-RU" smtClean="0"/>
-              <a:t>12.04.2015</a:t>
+              <a:t>13.04.2015</a:t>
             </a:fld>
             <a:endParaRPr lang="ru-RU"/>
           </a:p>
@@ -4046,7 +4063,7 @@
           <a:p>
             <a:fld id="{252F7152-2E34-4CF8-96E1-9C0B6BE1AFF1}" type="datetimeFigureOut">
               <a:rPr lang="ru-RU" smtClean="0"/>
-              <a:t>12.04.2015</a:t>
+              <a:t>13.04.2015</a:t>
             </a:fld>
             <a:endParaRPr lang="ru-RU"/>
           </a:p>
@@ -4301,7 +4318,7 @@
           <a:p>
             <a:fld id="{252F7152-2E34-4CF8-96E1-9C0B6BE1AFF1}" type="datetimeFigureOut">
               <a:rPr lang="ru-RU" smtClean="0"/>
-              <a:t>12.04.2015</a:t>
+              <a:t>13.04.2015</a:t>
             </a:fld>
             <a:endParaRPr lang="ru-RU"/>
           </a:p>
@@ -4564,7 +4581,7 @@
           <a:p>
             <a:fld id="{252F7152-2E34-4CF8-96E1-9C0B6BE1AFF1}" type="datetimeFigureOut">
               <a:rPr lang="ru-RU" smtClean="0"/>
-              <a:t>12.04.2015</a:t>
+              <a:t>13.04.2015</a:t>
             </a:fld>
             <a:endParaRPr lang="ru-RU"/>
           </a:p>
@@ -5307,7 +5324,7 @@
           <a:p>
             <a:fld id="{252F7152-2E34-4CF8-96E1-9C0B6BE1AFF1}" type="datetimeFigureOut">
               <a:rPr lang="ru-RU" smtClean="0"/>
-              <a:t>12.04.2015</a:t>
+              <a:t>13.04.2015</a:t>
             </a:fld>
             <a:endParaRPr lang="ru-RU"/>
           </a:p>
@@ -6083,7 +6100,7 @@
       </p:sp>
       <p:pic>
         <p:nvPicPr>
-          <p:cNvPr id="4" name="Рисунок 3"/>
+          <p:cNvPr id="3" name="Рисунок 2"/>
           <p:cNvPicPr>
             <a:picLocks noChangeAspect="1"/>
           </p:cNvPicPr>
@@ -6097,14 +6114,502 @@
         </p:blipFill>
         <p:spPr>
           <a:xfrm>
-            <a:off x="1579117" y="1445845"/>
-            <a:ext cx="6793102" cy="4458677"/>
+            <a:off x="2433638" y="1270000"/>
+            <a:ext cx="5495925" cy="5248275"/>
           </a:xfrm>
           <a:prstGeom prst="rect">
             <a:avLst/>
           </a:prstGeom>
         </p:spPr>
       </p:pic>
+    </p:spTree>
+    <p:extLst>
+      <p:ext uri="{BB962C8B-B14F-4D97-AF65-F5344CB8AC3E}">
+        <p14:creationId xmlns:p14="http://schemas.microsoft.com/office/powerpoint/2010/main" val="988532904"/>
+      </p:ext>
+    </p:extLst>
+  </p:cSld>
+  <p:clrMapOvr>
+    <a:masterClrMapping/>
+  </p:clrMapOvr>
+  <p:timing>
+    <p:tnLst>
+      <p:par>
+        <p:cTn id="1" dur="indefinite" restart="never" nodeType="tmRoot"/>
+      </p:par>
+    </p:tnLst>
+  </p:timing>
+</p:sld>
+</file>
+
+<file path=ppt/slides/slide4.xml><?xml version="1.0" encoding="utf-8"?>
+<p:sld xmlns:a="http://schemas.openxmlformats.org/drawingml/2006/main" xmlns:r="http://schemas.openxmlformats.org/officeDocument/2006/relationships" xmlns:p="http://schemas.openxmlformats.org/presentationml/2006/main">
+  <p:cSld>
+    <p:spTree>
+      <p:nvGrpSpPr>
+        <p:cNvPr id="1" name=""/>
+        <p:cNvGrpSpPr/>
+        <p:nvPr/>
+      </p:nvGrpSpPr>
+      <p:grpSpPr>
+        <a:xfrm>
+          <a:off x="0" y="0"/>
+          <a:ext cx="0" cy="0"/>
+          <a:chOff x="0" y="0"/>
+          <a:chExt cx="0" cy="0"/>
+        </a:xfrm>
+      </p:grpSpPr>
+      <p:sp>
+        <p:nvSpPr>
+          <p:cNvPr id="2" name="Заголовок 1"/>
+          <p:cNvSpPr>
+            <a:spLocks noGrp="1"/>
+          </p:cNvSpPr>
+          <p:nvPr>
+            <p:ph type="title"/>
+          </p:nvPr>
+        </p:nvSpPr>
+        <p:spPr/>
+        <p:txBody>
+          <a:bodyPr/>
+          <a:lstStyle/>
+          <a:p>
+            <a:pPr algn="ctr"/>
+            <a:r>
+              <a:rPr lang="en-US" dirty="0"/>
+              <a:t>Input Methods: what’s going on?</a:t>
+            </a:r>
+            <a:endParaRPr lang="ru-RU" dirty="0"/>
+          </a:p>
+        </p:txBody>
+      </p:sp>
+      <p:pic>
+        <p:nvPicPr>
+          <p:cNvPr id="3" name="Рисунок 2"/>
+          <p:cNvPicPr>
+            <a:picLocks noChangeAspect="1"/>
+          </p:cNvPicPr>
+          <p:nvPr/>
+        </p:nvPicPr>
+        <p:blipFill>
+          <a:blip r:embed="rId2"/>
+          <a:stretch>
+            <a:fillRect/>
+          </a:stretch>
+        </p:blipFill>
+        <p:spPr>
+          <a:xfrm>
+            <a:off x="2433638" y="1270000"/>
+            <a:ext cx="5495925" cy="5248275"/>
+          </a:xfrm>
+          <a:prstGeom prst="rect">
+            <a:avLst/>
+          </a:prstGeom>
+        </p:spPr>
+      </p:pic>
+      <p:sp>
+        <p:nvSpPr>
+          <p:cNvPr id="6" name="Полилиния 5"/>
+          <p:cNvSpPr/>
+          <p:nvPr/>
+        </p:nvSpPr>
+        <p:spPr>
+          <a:xfrm>
+            <a:off x="6205415" y="3259015"/>
+            <a:ext cx="1361370" cy="265723"/>
+          </a:xfrm>
+          <a:custGeom>
+            <a:avLst/>
+            <a:gdLst>
+              <a:gd name="connsiteX0" fmla="*/ 187570 w 1361370"/>
+              <a:gd name="connsiteY0" fmla="*/ 54708 h 265723"/>
+              <a:gd name="connsiteX1" fmla="*/ 289170 w 1361370"/>
+              <a:gd name="connsiteY1" fmla="*/ 39077 h 265723"/>
+              <a:gd name="connsiteX2" fmla="*/ 312616 w 1361370"/>
+              <a:gd name="connsiteY2" fmla="*/ 31262 h 265723"/>
+              <a:gd name="connsiteX3" fmla="*/ 898770 w 1361370"/>
+              <a:gd name="connsiteY3" fmla="*/ 23447 h 265723"/>
+              <a:gd name="connsiteX4" fmla="*/ 984739 w 1361370"/>
+              <a:gd name="connsiteY4" fmla="*/ 7816 h 265723"/>
+              <a:gd name="connsiteX5" fmla="*/ 1016000 w 1361370"/>
+              <a:gd name="connsiteY5" fmla="*/ 0 h 265723"/>
+              <a:gd name="connsiteX6" fmla="*/ 1164493 w 1361370"/>
+              <a:gd name="connsiteY6" fmla="*/ 7816 h 265723"/>
+              <a:gd name="connsiteX7" fmla="*/ 1211385 w 1361370"/>
+              <a:gd name="connsiteY7" fmla="*/ 23447 h 265723"/>
+              <a:gd name="connsiteX8" fmla="*/ 1234831 w 1361370"/>
+              <a:gd name="connsiteY8" fmla="*/ 31262 h 265723"/>
+              <a:gd name="connsiteX9" fmla="*/ 1258277 w 1361370"/>
+              <a:gd name="connsiteY9" fmla="*/ 54708 h 265723"/>
+              <a:gd name="connsiteX10" fmla="*/ 1289539 w 1361370"/>
+              <a:gd name="connsiteY10" fmla="*/ 70339 h 265723"/>
+              <a:gd name="connsiteX11" fmla="*/ 1336431 w 1361370"/>
+              <a:gd name="connsiteY11" fmla="*/ 93785 h 265723"/>
+              <a:gd name="connsiteX12" fmla="*/ 1359877 w 1361370"/>
+              <a:gd name="connsiteY12" fmla="*/ 117231 h 265723"/>
+              <a:gd name="connsiteX13" fmla="*/ 1336431 w 1361370"/>
+              <a:gd name="connsiteY13" fmla="*/ 203200 h 265723"/>
+              <a:gd name="connsiteX14" fmla="*/ 1312985 w 1361370"/>
+              <a:gd name="connsiteY14" fmla="*/ 218831 h 265723"/>
+              <a:gd name="connsiteX15" fmla="*/ 1289539 w 1361370"/>
+              <a:gd name="connsiteY15" fmla="*/ 226647 h 265723"/>
+              <a:gd name="connsiteX16" fmla="*/ 1000370 w 1361370"/>
+              <a:gd name="connsiteY16" fmla="*/ 234462 h 265723"/>
+              <a:gd name="connsiteX17" fmla="*/ 914400 w 1361370"/>
+              <a:gd name="connsiteY17" fmla="*/ 250093 h 265723"/>
+              <a:gd name="connsiteX18" fmla="*/ 836247 w 1361370"/>
+              <a:gd name="connsiteY18" fmla="*/ 265723 h 265723"/>
+              <a:gd name="connsiteX19" fmla="*/ 296985 w 1361370"/>
+              <a:gd name="connsiteY19" fmla="*/ 257908 h 265723"/>
+              <a:gd name="connsiteX20" fmla="*/ 250093 w 1361370"/>
+              <a:gd name="connsiteY20" fmla="*/ 250093 h 265723"/>
+              <a:gd name="connsiteX21" fmla="*/ 46893 w 1361370"/>
+              <a:gd name="connsiteY21" fmla="*/ 234462 h 265723"/>
+              <a:gd name="connsiteX22" fmla="*/ 0 w 1361370"/>
+              <a:gd name="connsiteY22" fmla="*/ 226647 h 265723"/>
+              <a:gd name="connsiteX23" fmla="*/ 7816 w 1361370"/>
+              <a:gd name="connsiteY23" fmla="*/ 187570 h 265723"/>
+              <a:gd name="connsiteX24" fmla="*/ 54708 w 1361370"/>
+              <a:gd name="connsiteY24" fmla="*/ 140677 h 265723"/>
+              <a:gd name="connsiteX25" fmla="*/ 93785 w 1361370"/>
+              <a:gd name="connsiteY25" fmla="*/ 132862 h 265723"/>
+              <a:gd name="connsiteX26" fmla="*/ 117231 w 1361370"/>
+              <a:gd name="connsiteY26" fmla="*/ 125047 h 265723"/>
+              <a:gd name="connsiteX27" fmla="*/ 187570 w 1361370"/>
+              <a:gd name="connsiteY27" fmla="*/ 54708 h 265723"/>
+            </a:gdLst>
+            <a:ahLst/>
+            <a:cxnLst>
+              <a:cxn ang="0">
+                <a:pos x="connsiteX0" y="connsiteY0"/>
+              </a:cxn>
+              <a:cxn ang="0">
+                <a:pos x="connsiteX1" y="connsiteY1"/>
+              </a:cxn>
+              <a:cxn ang="0">
+                <a:pos x="connsiteX2" y="connsiteY2"/>
+              </a:cxn>
+              <a:cxn ang="0">
+                <a:pos x="connsiteX3" y="connsiteY3"/>
+              </a:cxn>
+              <a:cxn ang="0">
+                <a:pos x="connsiteX4" y="connsiteY4"/>
+              </a:cxn>
+              <a:cxn ang="0">
+                <a:pos x="connsiteX5" y="connsiteY5"/>
+              </a:cxn>
+              <a:cxn ang="0">
+                <a:pos x="connsiteX6" y="connsiteY6"/>
+              </a:cxn>
+              <a:cxn ang="0">
+                <a:pos x="connsiteX7" y="connsiteY7"/>
+              </a:cxn>
+              <a:cxn ang="0">
+                <a:pos x="connsiteX8" y="connsiteY8"/>
+              </a:cxn>
+              <a:cxn ang="0">
+                <a:pos x="connsiteX9" y="connsiteY9"/>
+              </a:cxn>
+              <a:cxn ang="0">
+                <a:pos x="connsiteX10" y="connsiteY10"/>
+              </a:cxn>
+              <a:cxn ang="0">
+                <a:pos x="connsiteX11" y="connsiteY11"/>
+              </a:cxn>
+              <a:cxn ang="0">
+                <a:pos x="connsiteX12" y="connsiteY12"/>
+              </a:cxn>
+              <a:cxn ang="0">
+                <a:pos x="connsiteX13" y="connsiteY13"/>
+              </a:cxn>
+              <a:cxn ang="0">
+                <a:pos x="connsiteX14" y="connsiteY14"/>
+              </a:cxn>
+              <a:cxn ang="0">
+                <a:pos x="connsiteX15" y="connsiteY15"/>
+              </a:cxn>
+              <a:cxn ang="0">
+                <a:pos x="connsiteX16" y="connsiteY16"/>
+              </a:cxn>
+              <a:cxn ang="0">
+                <a:pos x="connsiteX17" y="connsiteY17"/>
+              </a:cxn>
+              <a:cxn ang="0">
+                <a:pos x="connsiteX18" y="connsiteY18"/>
+              </a:cxn>
+              <a:cxn ang="0">
+                <a:pos x="connsiteX19" y="connsiteY19"/>
+              </a:cxn>
+              <a:cxn ang="0">
+                <a:pos x="connsiteX20" y="connsiteY20"/>
+              </a:cxn>
+              <a:cxn ang="0">
+                <a:pos x="connsiteX21" y="connsiteY21"/>
+              </a:cxn>
+              <a:cxn ang="0">
+                <a:pos x="connsiteX22" y="connsiteY22"/>
+              </a:cxn>
+              <a:cxn ang="0">
+                <a:pos x="connsiteX23" y="connsiteY23"/>
+              </a:cxn>
+              <a:cxn ang="0">
+                <a:pos x="connsiteX24" y="connsiteY24"/>
+              </a:cxn>
+              <a:cxn ang="0">
+                <a:pos x="connsiteX25" y="connsiteY25"/>
+              </a:cxn>
+              <a:cxn ang="0">
+                <a:pos x="connsiteX26" y="connsiteY26"/>
+              </a:cxn>
+              <a:cxn ang="0">
+                <a:pos x="connsiteX27" y="connsiteY27"/>
+              </a:cxn>
+            </a:cxnLst>
+            <a:rect l="l" t="t" r="r" b="b"/>
+            <a:pathLst>
+              <a:path w="1361370" h="265723">
+                <a:moveTo>
+                  <a:pt x="187570" y="54708"/>
+                </a:moveTo>
+                <a:cubicBezTo>
+                  <a:pt x="205035" y="52213"/>
+                  <a:pt x="269640" y="43417"/>
+                  <a:pt x="289170" y="39077"/>
+                </a:cubicBezTo>
+                <a:cubicBezTo>
+                  <a:pt x="297212" y="37290"/>
+                  <a:pt x="304381" y="31473"/>
+                  <a:pt x="312616" y="31262"/>
+                </a:cubicBezTo>
+                <a:cubicBezTo>
+                  <a:pt x="507954" y="26254"/>
+                  <a:pt x="703385" y="26052"/>
+                  <a:pt x="898770" y="23447"/>
+                </a:cubicBezTo>
+                <a:cubicBezTo>
+                  <a:pt x="969673" y="5720"/>
+                  <a:pt x="882061" y="26485"/>
+                  <a:pt x="984739" y="7816"/>
+                </a:cubicBezTo>
+                <a:cubicBezTo>
+                  <a:pt x="995307" y="5895"/>
+                  <a:pt x="1005580" y="2605"/>
+                  <a:pt x="1016000" y="0"/>
+                </a:cubicBezTo>
+                <a:cubicBezTo>
+                  <a:pt x="1065498" y="2605"/>
+                  <a:pt x="1115280" y="1910"/>
+                  <a:pt x="1164493" y="7816"/>
+                </a:cubicBezTo>
+                <a:cubicBezTo>
+                  <a:pt x="1180852" y="9779"/>
+                  <a:pt x="1195754" y="18237"/>
+                  <a:pt x="1211385" y="23447"/>
+                </a:cubicBezTo>
+                <a:lnTo>
+                  <a:pt x="1234831" y="31262"/>
+                </a:lnTo>
+                <a:cubicBezTo>
+                  <a:pt x="1242646" y="39077"/>
+                  <a:pt x="1249283" y="48284"/>
+                  <a:pt x="1258277" y="54708"/>
+                </a:cubicBezTo>
+                <a:cubicBezTo>
+                  <a:pt x="1267758" y="61480"/>
+                  <a:pt x="1279423" y="64559"/>
+                  <a:pt x="1289539" y="70339"/>
+                </a:cubicBezTo>
+                <a:cubicBezTo>
+                  <a:pt x="1331960" y="94580"/>
+                  <a:pt x="1293444" y="79457"/>
+                  <a:pt x="1336431" y="93785"/>
+                </a:cubicBezTo>
+                <a:cubicBezTo>
+                  <a:pt x="1344246" y="101600"/>
+                  <a:pt x="1357900" y="106357"/>
+                  <a:pt x="1359877" y="117231"/>
+                </a:cubicBezTo>
+                <a:cubicBezTo>
+                  <a:pt x="1364856" y="144616"/>
+                  <a:pt x="1357470" y="182161"/>
+                  <a:pt x="1336431" y="203200"/>
+                </a:cubicBezTo>
+                <a:cubicBezTo>
+                  <a:pt x="1329789" y="209842"/>
+                  <a:pt x="1321386" y="214630"/>
+                  <a:pt x="1312985" y="218831"/>
+                </a:cubicBezTo>
+                <a:cubicBezTo>
+                  <a:pt x="1305617" y="222515"/>
+                  <a:pt x="1297767" y="226236"/>
+                  <a:pt x="1289539" y="226647"/>
+                </a:cubicBezTo>
+                <a:cubicBezTo>
+                  <a:pt x="1193234" y="231462"/>
+                  <a:pt x="1096760" y="231857"/>
+                  <a:pt x="1000370" y="234462"/>
+                </a:cubicBezTo>
+                <a:cubicBezTo>
+                  <a:pt x="933821" y="251098"/>
+                  <a:pt x="1009608" y="233292"/>
+                  <a:pt x="914400" y="250093"/>
+                </a:cubicBezTo>
+                <a:cubicBezTo>
+                  <a:pt x="888237" y="254710"/>
+                  <a:pt x="862298" y="260513"/>
+                  <a:pt x="836247" y="265723"/>
+                </a:cubicBezTo>
+                <a:lnTo>
+                  <a:pt x="296985" y="257908"/>
+                </a:lnTo>
+                <a:cubicBezTo>
+                  <a:pt x="281144" y="257486"/>
+                  <a:pt x="265868" y="251595"/>
+                  <a:pt x="250093" y="250093"/>
+                </a:cubicBezTo>
+                <a:cubicBezTo>
+                  <a:pt x="121043" y="237802"/>
+                  <a:pt x="159454" y="247704"/>
+                  <a:pt x="46893" y="234462"/>
+                </a:cubicBezTo>
+                <a:cubicBezTo>
+                  <a:pt x="31155" y="232611"/>
+                  <a:pt x="15631" y="229252"/>
+                  <a:pt x="0" y="226647"/>
+                </a:cubicBezTo>
+                <a:cubicBezTo>
+                  <a:pt x="2605" y="213621"/>
+                  <a:pt x="2421" y="199709"/>
+                  <a:pt x="7816" y="187570"/>
+                </a:cubicBezTo>
+                <a:cubicBezTo>
+                  <a:pt x="15284" y="170766"/>
+                  <a:pt x="36009" y="147689"/>
+                  <a:pt x="54708" y="140677"/>
+                </a:cubicBezTo>
+                <a:cubicBezTo>
+                  <a:pt x="67146" y="136013"/>
+                  <a:pt x="80898" y="136084"/>
+                  <a:pt x="93785" y="132862"/>
+                </a:cubicBezTo>
+                <a:cubicBezTo>
+                  <a:pt x="101777" y="130864"/>
+                  <a:pt x="109416" y="127652"/>
+                  <a:pt x="117231" y="125047"/>
+                </a:cubicBezTo>
+                <a:lnTo>
+                  <a:pt x="187570" y="54708"/>
+                </a:lnTo>
+                <a:close/>
+              </a:path>
+            </a:pathLst>
+          </a:custGeom>
+          <a:noFill/>
+          <a:ln>
+            <a:solidFill>
+              <a:srgbClr val="FF0000"/>
+            </a:solidFill>
+          </a:ln>
+        </p:spPr>
+        <p:style>
+          <a:lnRef idx="2">
+            <a:schemeClr val="accent1">
+              <a:shade val="50000"/>
+            </a:schemeClr>
+          </a:lnRef>
+          <a:fillRef idx="1">
+            <a:schemeClr val="accent1"/>
+          </a:fillRef>
+          <a:effectRef idx="0">
+            <a:schemeClr val="accent1"/>
+          </a:effectRef>
+          <a:fontRef idx="minor">
+            <a:schemeClr val="lt1"/>
+          </a:fontRef>
+        </p:style>
+        <p:txBody>
+          <a:bodyPr rtlCol="0" anchor="ctr"/>
+          <a:lstStyle/>
+          <a:p>
+            <a:pPr algn="ctr"/>
+            <a:endParaRPr lang="ru-RU"/>
+          </a:p>
+        </p:txBody>
+      </p:sp>
+      <p:sp>
+        <p:nvSpPr>
+          <p:cNvPr id="7" name="Выноска-облако 6"/>
+          <p:cNvSpPr/>
+          <p:nvPr/>
+        </p:nvSpPr>
+        <p:spPr>
+          <a:xfrm>
+            <a:off x="7929563" y="930152"/>
+            <a:ext cx="3097945" cy="2227385"/>
+          </a:xfrm>
+          <a:prstGeom prst="cloudCallout">
+            <a:avLst>
+              <a:gd name="adj1" fmla="val -56404"/>
+              <a:gd name="adj2" fmla="val 60746"/>
+            </a:avLst>
+          </a:prstGeom>
+        </p:spPr>
+        <p:style>
+          <a:lnRef idx="2">
+            <a:schemeClr val="accent1">
+              <a:shade val="50000"/>
+            </a:schemeClr>
+          </a:lnRef>
+          <a:fillRef idx="1">
+            <a:schemeClr val="accent1"/>
+          </a:fillRef>
+          <a:effectRef idx="0">
+            <a:schemeClr val="accent1"/>
+          </a:effectRef>
+          <a:fontRef idx="minor">
+            <a:schemeClr val="lt1"/>
+          </a:fontRef>
+        </p:style>
+        <p:txBody>
+          <a:bodyPr rtlCol="0" anchor="ctr"/>
+          <a:lstStyle/>
+          <a:p>
+            <a:pPr algn="ctr"/>
+            <a:endParaRPr lang="ru-RU"/>
+          </a:p>
+        </p:txBody>
+      </p:sp>
+      <p:sp>
+        <p:nvSpPr>
+          <p:cNvPr id="8" name="TextBox 7"/>
+          <p:cNvSpPr txBox="1"/>
+          <p:nvPr/>
+        </p:nvSpPr>
+        <p:spPr>
+          <a:xfrm>
+            <a:off x="8502914" y="1166681"/>
+            <a:ext cx="1951241" cy="1754326"/>
+          </a:xfrm>
+          <a:prstGeom prst="rect">
+            <a:avLst/>
+          </a:prstGeom>
+          <a:noFill/>
+        </p:spPr>
+        <p:txBody>
+          <a:bodyPr wrap="square" rtlCol="0">
+            <a:spAutoFit/>
+          </a:bodyPr>
+          <a:lstStyle/>
+          <a:p>
+            <a:pPr algn="ctr"/>
+            <a:r>
+              <a:rPr lang="en-US" dirty="0" smtClean="0"/>
+              <a:t>We want to develop the device with the same characteristics (or better)</a:t>
+            </a:r>
+            <a:endParaRPr lang="ru-RU" dirty="0"/>
+          </a:p>
+        </p:txBody>
+      </p:sp>
     </p:spTree>
     <p:extLst>
       <p:ext uri="{BB962C8B-B14F-4D97-AF65-F5344CB8AC3E}">
@@ -6125,7 +6630,7 @@
 </p:sld>
 </file>
 
-<file path=ppt/slides/slide4.xml><?xml version="1.0" encoding="utf-8"?>
+<file path=ppt/slides/slide5.xml><?xml version="1.0" encoding="utf-8"?>
 <p:sld xmlns:a="http://schemas.openxmlformats.org/drawingml/2006/main" xmlns:r="http://schemas.openxmlformats.org/officeDocument/2006/relationships" xmlns:p="http://schemas.openxmlformats.org/presentationml/2006/main">
   <p:cSld>
     <p:spTree>
@@ -6210,7 +6715,7 @@
 </p:sld>
 </file>
 
-<file path=ppt/slides/slide5.xml><?xml version="1.0" encoding="utf-8"?>
+<file path=ppt/slides/slide6.xml><?xml version="1.0" encoding="utf-8"?>
 <p:sld xmlns:a="http://schemas.openxmlformats.org/drawingml/2006/main" xmlns:r="http://schemas.openxmlformats.org/officeDocument/2006/relationships" xmlns:p="http://schemas.openxmlformats.org/presentationml/2006/main">
   <p:cSld>
     <p:spTree>
@@ -6295,7 +6800,7 @@
 </p:sld>
 </file>
 
-<file path=ppt/slides/slide6.xml><?xml version="1.0" encoding="utf-8"?>
+<file path=ppt/slides/slide7.xml><?xml version="1.0" encoding="utf-8"?>
 <p:sld xmlns:a="http://schemas.openxmlformats.org/drawingml/2006/main" xmlns:r="http://schemas.openxmlformats.org/officeDocument/2006/relationships" xmlns:p="http://schemas.openxmlformats.org/presentationml/2006/main">
   <p:cSld>
     <p:spTree>
@@ -6380,7 +6885,7 @@
 </p:sld>
 </file>
 
-<file path=ppt/slides/slide7.xml><?xml version="1.0" encoding="utf-8"?>
+<file path=ppt/slides/slide8.xml><?xml version="1.0" encoding="utf-8"?>
 <p:sld xmlns:a="http://schemas.openxmlformats.org/drawingml/2006/main" xmlns:r="http://schemas.openxmlformats.org/officeDocument/2006/relationships" xmlns:p="http://schemas.openxmlformats.org/presentationml/2006/main">
   <p:cSld>
     <p:spTree>
@@ -6473,7 +6978,7 @@
 </p:sld>
 </file>
 
-<file path=ppt/slides/slide8.xml><?xml version="1.0" encoding="utf-8"?>
+<file path=ppt/slides/slide9.xml><?xml version="1.0" encoding="utf-8"?>
 <p:sld xmlns:a="http://schemas.openxmlformats.org/drawingml/2006/main" xmlns:r="http://schemas.openxmlformats.org/officeDocument/2006/relationships" xmlns:p="http://schemas.openxmlformats.org/presentationml/2006/main">
   <p:cSld>
     <p:spTree>
@@ -6790,7 +7295,7 @@
   <a:extraClrSchemeLst/>
   <a:extLst>
     <a:ext uri="{05A4C25C-085E-4340-85A3-A5531E510DB2}">
-      <thm15:themeFamily xmlns:thm15="http://schemas.microsoft.com/office/thememl/2012/main" xmlns="" name="Facet" id="{C0C680CD-088A-49FC-A102-D699147F32B2}" vid="{CFBC31BA-B70F-4F30-BCAA-4F3011E16C4D}"/>
+      <thm15:themeFamily xmlns:thm15="http://schemas.microsoft.com/office/thememl/2012/main" name="Facet" id="{C0C680CD-088A-49FC-A102-D699147F32B2}" vid="{CFBC31BA-B70F-4F30-BCAA-4F3011E16C4D}"/>
     </a:ext>
   </a:extLst>
 </a:theme>

</xml_diff>

<commit_message>
foresight in my work (1.2 v)
</commit_message>
<xml_diff>
--- a/Foresight_in_work/Foresight_methodologies.pptx
+++ b/Foresight_in_work/Foresight_methodologies.pptx
@@ -12,8 +12,9 @@
     <p:sldId id="261" r:id="rId6"/>
     <p:sldId id="262" r:id="rId7"/>
     <p:sldId id="263" r:id="rId8"/>
-    <p:sldId id="264" r:id="rId9"/>
-    <p:sldId id="265" r:id="rId10"/>
+    <p:sldId id="267" r:id="rId9"/>
+    <p:sldId id="264" r:id="rId10"/>
+    <p:sldId id="265" r:id="rId11"/>
   </p:sldIdLst>
   <p:sldSz cx="12192000" cy="6858000"/>
   <p:notesSz cx="6858000" cy="9144000"/>
@@ -853,7 +854,7 @@
           <a:p>
             <a:fld id="{252F7152-2E34-4CF8-96E1-9C0B6BE1AFF1}" type="datetimeFigureOut">
               <a:rPr lang="ru-RU" smtClean="0"/>
-              <a:t>13.04.2015</a:t>
+              <a:t>14.04.2015</a:t>
             </a:fld>
             <a:endParaRPr lang="ru-RU"/>
           </a:p>
@@ -1104,7 +1105,7 @@
           <a:p>
             <a:fld id="{252F7152-2E34-4CF8-96E1-9C0B6BE1AFF1}" type="datetimeFigureOut">
               <a:rPr lang="ru-RU" smtClean="0"/>
-              <a:t>13.04.2015</a:t>
+              <a:t>14.04.2015</a:t>
             </a:fld>
             <a:endParaRPr lang="ru-RU"/>
           </a:p>
@@ -1418,7 +1419,7 @@
           <a:p>
             <a:fld id="{252F7152-2E34-4CF8-96E1-9C0B6BE1AFF1}" type="datetimeFigureOut">
               <a:rPr lang="ru-RU" smtClean="0"/>
-              <a:t>13.04.2015</a:t>
+              <a:t>14.04.2015</a:t>
             </a:fld>
             <a:endParaRPr lang="ru-RU"/>
           </a:p>
@@ -1759,7 +1760,7 @@
           <a:p>
             <a:fld id="{252F7152-2E34-4CF8-96E1-9C0B6BE1AFF1}" type="datetimeFigureOut">
               <a:rPr lang="ru-RU" smtClean="0"/>
-              <a:t>13.04.2015</a:t>
+              <a:t>14.04.2015</a:t>
             </a:fld>
             <a:endParaRPr lang="ru-RU"/>
           </a:p>
@@ -2073,7 +2074,7 @@
           <a:p>
             <a:fld id="{252F7152-2E34-4CF8-96E1-9C0B6BE1AFF1}" type="datetimeFigureOut">
               <a:rPr lang="ru-RU" smtClean="0"/>
-              <a:t>13.04.2015</a:t>
+              <a:t>14.04.2015</a:t>
             </a:fld>
             <a:endParaRPr lang="ru-RU"/>
           </a:p>
@@ -2466,7 +2467,7 @@
           <a:p>
             <a:fld id="{252F7152-2E34-4CF8-96E1-9C0B6BE1AFF1}" type="datetimeFigureOut">
               <a:rPr lang="ru-RU" smtClean="0"/>
-              <a:t>13.04.2015</a:t>
+              <a:t>14.04.2015</a:t>
             </a:fld>
             <a:endParaRPr lang="ru-RU"/>
           </a:p>
@@ -2636,7 +2637,7 @@
           <a:p>
             <a:fld id="{252F7152-2E34-4CF8-96E1-9C0B6BE1AFF1}" type="datetimeFigureOut">
               <a:rPr lang="ru-RU" smtClean="0"/>
-              <a:t>13.04.2015</a:t>
+              <a:t>14.04.2015</a:t>
             </a:fld>
             <a:endParaRPr lang="ru-RU"/>
           </a:p>
@@ -2816,7 +2817,7 @@
           <a:p>
             <a:fld id="{252F7152-2E34-4CF8-96E1-9C0B6BE1AFF1}" type="datetimeFigureOut">
               <a:rPr lang="ru-RU" smtClean="0"/>
-              <a:t>13.04.2015</a:t>
+              <a:t>14.04.2015</a:t>
             </a:fld>
             <a:endParaRPr lang="ru-RU"/>
           </a:p>
@@ -2992,7 +2993,7 @@
           <a:p>
             <a:fld id="{252F7152-2E34-4CF8-96E1-9C0B6BE1AFF1}" type="datetimeFigureOut">
               <a:rPr lang="ru-RU" smtClean="0"/>
-              <a:t>13.04.2015</a:t>
+              <a:t>14.04.2015</a:t>
             </a:fld>
             <a:endParaRPr lang="ru-RU"/>
           </a:p>
@@ -3239,7 +3240,7 @@
           <a:p>
             <a:fld id="{252F7152-2E34-4CF8-96E1-9C0B6BE1AFF1}" type="datetimeFigureOut">
               <a:rPr lang="ru-RU" smtClean="0"/>
-              <a:t>13.04.2015</a:t>
+              <a:t>14.04.2015</a:t>
             </a:fld>
             <a:endParaRPr lang="ru-RU"/>
           </a:p>
@@ -3471,7 +3472,7 @@
           <a:p>
             <a:fld id="{252F7152-2E34-4CF8-96E1-9C0B6BE1AFF1}" type="datetimeFigureOut">
               <a:rPr lang="ru-RU" smtClean="0"/>
-              <a:t>13.04.2015</a:t>
+              <a:t>14.04.2015</a:t>
             </a:fld>
             <a:endParaRPr lang="ru-RU"/>
           </a:p>
@@ -3845,7 +3846,7 @@
           <a:p>
             <a:fld id="{252F7152-2E34-4CF8-96E1-9C0B6BE1AFF1}" type="datetimeFigureOut">
               <a:rPr lang="ru-RU" smtClean="0"/>
-              <a:t>13.04.2015</a:t>
+              <a:t>14.04.2015</a:t>
             </a:fld>
             <a:endParaRPr lang="ru-RU"/>
           </a:p>
@@ -3968,7 +3969,7 @@
           <a:p>
             <a:fld id="{252F7152-2E34-4CF8-96E1-9C0B6BE1AFF1}" type="datetimeFigureOut">
               <a:rPr lang="ru-RU" smtClean="0"/>
-              <a:t>13.04.2015</a:t>
+              <a:t>14.04.2015</a:t>
             </a:fld>
             <a:endParaRPr lang="ru-RU"/>
           </a:p>
@@ -4063,7 +4064,7 @@
           <a:p>
             <a:fld id="{252F7152-2E34-4CF8-96E1-9C0B6BE1AFF1}" type="datetimeFigureOut">
               <a:rPr lang="ru-RU" smtClean="0"/>
-              <a:t>13.04.2015</a:t>
+              <a:t>14.04.2015</a:t>
             </a:fld>
             <a:endParaRPr lang="ru-RU"/>
           </a:p>
@@ -4318,7 +4319,7 @@
           <a:p>
             <a:fld id="{252F7152-2E34-4CF8-96E1-9C0B6BE1AFF1}" type="datetimeFigureOut">
               <a:rPr lang="ru-RU" smtClean="0"/>
-              <a:t>13.04.2015</a:t>
+              <a:t>14.04.2015</a:t>
             </a:fld>
             <a:endParaRPr lang="ru-RU"/>
           </a:p>
@@ -4581,7 +4582,7 @@
           <a:p>
             <a:fld id="{252F7152-2E34-4CF8-96E1-9C0B6BE1AFF1}" type="datetimeFigureOut">
               <a:rPr lang="ru-RU" smtClean="0"/>
-              <a:t>13.04.2015</a:t>
+              <a:t>14.04.2015</a:t>
             </a:fld>
             <a:endParaRPr lang="ru-RU"/>
           </a:p>
@@ -5324,7 +5325,7 @@
           <a:p>
             <a:fld id="{252F7152-2E34-4CF8-96E1-9C0B6BE1AFF1}" type="datetimeFigureOut">
               <a:rPr lang="ru-RU" smtClean="0"/>
-              <a:t>13.04.2015</a:t>
+              <a:t>14.04.2015</a:t>
             </a:fld>
             <a:endParaRPr lang="ru-RU"/>
           </a:p>
@@ -5972,6 +5973,72 @@
 </p:sld>
 </file>
 
+<file path=ppt/slides/slide10.xml><?xml version="1.0" encoding="utf-8"?>
+<p:sld xmlns:a="http://schemas.openxmlformats.org/drawingml/2006/main" xmlns:r="http://schemas.openxmlformats.org/officeDocument/2006/relationships" xmlns:p="http://schemas.openxmlformats.org/presentationml/2006/main">
+  <p:cSld>
+    <p:spTree>
+      <p:nvGrpSpPr>
+        <p:cNvPr id="1" name=""/>
+        <p:cNvGrpSpPr/>
+        <p:nvPr/>
+      </p:nvGrpSpPr>
+      <p:grpSpPr>
+        <a:xfrm>
+          <a:off x="0" y="0"/>
+          <a:ext cx="0" cy="0"/>
+          <a:chOff x="0" y="0"/>
+          <a:chExt cx="0" cy="0"/>
+        </a:xfrm>
+      </p:grpSpPr>
+      <p:sp>
+        <p:nvSpPr>
+          <p:cNvPr id="2" name="Заголовок 1"/>
+          <p:cNvSpPr>
+            <a:spLocks noGrp="1"/>
+          </p:cNvSpPr>
+          <p:nvPr>
+            <p:ph type="title"/>
+          </p:nvPr>
+        </p:nvSpPr>
+        <p:spPr>
+          <a:xfrm>
+            <a:off x="669518" y="2149230"/>
+            <a:ext cx="8596668" cy="1320800"/>
+          </a:xfrm>
+        </p:spPr>
+        <p:txBody>
+          <a:bodyPr/>
+          <a:lstStyle/>
+          <a:p>
+            <a:pPr algn="ctr"/>
+            <a:r>
+              <a:rPr lang="en-US" dirty="0" smtClean="0"/>
+              <a:t>Thank you for your attention!</a:t>
+            </a:r>
+            <a:endParaRPr lang="ru-RU" dirty="0"/>
+          </a:p>
+        </p:txBody>
+      </p:sp>
+    </p:spTree>
+    <p:extLst>
+      <p:ext uri="{BB962C8B-B14F-4D97-AF65-F5344CB8AC3E}">
+        <p14:creationId xmlns:p14="http://schemas.microsoft.com/office/powerpoint/2010/main" val="3087094628"/>
+      </p:ext>
+    </p:extLst>
+  </p:cSld>
+  <p:clrMapOvr>
+    <a:masterClrMapping/>
+  </p:clrMapOvr>
+  <p:timing>
+    <p:tnLst>
+      <p:par>
+        <p:cTn id="1" dur="indefinite" restart="never" nodeType="tmRoot"/>
+      </p:par>
+    </p:tnLst>
+  </p:timing>
+</p:sld>
+</file>
+
 <file path=ppt/slides/slide2.xml><?xml version="1.0" encoding="utf-8"?>
 <p:sld xmlns:a="http://schemas.openxmlformats.org/drawingml/2006/main" xmlns:r="http://schemas.openxmlformats.org/officeDocument/2006/relationships" xmlns:p="http://schemas.openxmlformats.org/presentationml/2006/main">
   <p:cSld>
@@ -6920,48 +6987,127 @@
             <a:pPr algn="ctr"/>
             <a:r>
               <a:rPr lang="en-US" dirty="0"/>
-              <a:t>Concluding Comments</a:t>
+              <a:t>Prospective Methods: what might happen?</a:t>
             </a:r>
             <a:endParaRPr lang="ru-RU" dirty="0"/>
           </a:p>
         </p:txBody>
       </p:sp>
-      <p:pic>
-        <p:nvPicPr>
-          <p:cNvPr id="4" name="Content Placeholder 4"/>
-          <p:cNvPicPr>
-            <a:picLocks noGrp="1" noChangeAspect="1"/>
-          </p:cNvPicPr>
-          <p:nvPr>
-            <p:ph sz="half" idx="4294967295"/>
-          </p:nvPr>
-        </p:nvPicPr>
-        <p:blipFill>
-          <a:blip r:embed="rId2">
-            <a:extLst>
-              <a:ext uri="{28A0092B-C50C-407E-A947-70E740481C1C}">
-                <a14:useLocalDpi xmlns:a14="http://schemas.microsoft.com/office/drawing/2010/main" val="0"/>
-              </a:ext>
-            </a:extLst>
-          </a:blip>
-          <a:stretch>
-            <a:fillRect/>
-          </a:stretch>
-        </p:blipFill>
+      <p:sp>
+        <p:nvSpPr>
+          <p:cNvPr id="3" name="TextBox 2"/>
+          <p:cNvSpPr txBox="1"/>
+          <p:nvPr/>
+        </p:nvSpPr>
         <p:spPr>
           <a:xfrm>
-            <a:off x="3089520" y="2132148"/>
-            <a:ext cx="3886200" cy="2914651"/>
+            <a:off x="1101968" y="2203938"/>
+            <a:ext cx="5861539" cy="3139321"/>
           </a:xfrm>
           <a:prstGeom prst="rect">
             <a:avLst/>
           </a:prstGeom>
+          <a:noFill/>
         </p:spPr>
-      </p:pic>
+        <p:txBody>
+          <a:bodyPr wrap="square" rtlCol="0">
+            <a:spAutoFit/>
+          </a:bodyPr>
+          <a:lstStyle/>
+          <a:p>
+            <a:r>
+              <a:rPr lang="en-US" dirty="0" smtClean="0"/>
+              <a:t>Scenario 1</a:t>
+            </a:r>
+          </a:p>
+          <a:p>
+            <a:r>
+              <a:rPr lang="en-US" dirty="0" smtClean="0"/>
+              <a:t>We will use the </a:t>
+            </a:r>
+            <a:r>
+              <a:rPr lang="en-US" dirty="0" err="1" smtClean="0"/>
+              <a:t>CdTe</a:t>
+            </a:r>
+            <a:r>
+              <a:rPr lang="en-US" dirty="0" smtClean="0"/>
+              <a:t> detector with the good energy resolution and  low emission time</a:t>
+            </a:r>
+          </a:p>
+          <a:p>
+            <a:endParaRPr lang="en-US" dirty="0"/>
+          </a:p>
+          <a:p>
+            <a:r>
+              <a:rPr lang="en-US" dirty="0"/>
+              <a:t>Scenario </a:t>
+            </a:r>
+            <a:r>
+              <a:rPr lang="en-US" dirty="0" smtClean="0"/>
+              <a:t>2</a:t>
+            </a:r>
+            <a:endParaRPr lang="en-US" dirty="0"/>
+          </a:p>
+          <a:p>
+            <a:r>
+              <a:rPr lang="en-US" dirty="0"/>
+              <a:t>We will </a:t>
+            </a:r>
+            <a:r>
+              <a:rPr lang="en-US" dirty="0" smtClean="0"/>
+              <a:t>use the </a:t>
+            </a:r>
+            <a:r>
+              <a:rPr lang="en-US" dirty="0" err="1" smtClean="0"/>
+              <a:t>SiPM</a:t>
+            </a:r>
+            <a:r>
+              <a:rPr lang="en-US" dirty="0" smtClean="0"/>
+              <a:t>-scintillator detector with the worse energy </a:t>
+            </a:r>
+            <a:r>
+              <a:rPr lang="en-US" dirty="0"/>
+              <a:t>resolution </a:t>
+            </a:r>
+            <a:r>
+              <a:rPr lang="en-US" dirty="0" smtClean="0"/>
+              <a:t>but shorter emission time</a:t>
+            </a:r>
+          </a:p>
+          <a:p>
+            <a:endParaRPr lang="en-US" dirty="0"/>
+          </a:p>
+          <a:p>
+            <a:r>
+              <a:rPr lang="en-US" dirty="0"/>
+              <a:t>Scenario </a:t>
+            </a:r>
+            <a:r>
+              <a:rPr lang="en-US" dirty="0" smtClean="0"/>
+              <a:t>3</a:t>
+            </a:r>
+            <a:endParaRPr lang="en-US" dirty="0"/>
+          </a:p>
+          <a:p>
+            <a:r>
+              <a:rPr lang="en-US" dirty="0"/>
+              <a:t>We will use the </a:t>
+            </a:r>
+            <a:r>
+              <a:rPr lang="en-US" dirty="0" smtClean="0"/>
+              <a:t>combination of these detectors</a:t>
+            </a:r>
+            <a:endParaRPr lang="en-US" dirty="0"/>
+          </a:p>
+          <a:p>
+            <a:endParaRPr lang="ru-RU" dirty="0"/>
+          </a:p>
+        </p:txBody>
+      </p:sp>
     </p:spTree>
     <p:extLst>
       <p:ext uri="{BB962C8B-B14F-4D97-AF65-F5344CB8AC3E}">
-        <p14:creationId xmlns:p14="http://schemas.microsoft.com/office/powerpoint/2010/main" val="633993582"/>
+        <p14:creationId xmlns:p14="http://schemas.microsoft.com/office/powerpoint/2010/main" val="2455233009"/>
       </p:ext>
     </p:extLst>
   </p:cSld>
@@ -7005,29 +7151,56 @@
             <p:ph type="title"/>
           </p:nvPr>
         </p:nvSpPr>
+        <p:spPr/>
+        <p:txBody>
+          <a:bodyPr/>
+          <a:lstStyle/>
+          <a:p>
+            <a:pPr algn="ctr"/>
+            <a:r>
+              <a:rPr lang="en-US" dirty="0"/>
+              <a:t>Concluding Comments</a:t>
+            </a:r>
+            <a:endParaRPr lang="ru-RU" dirty="0"/>
+          </a:p>
+        </p:txBody>
+      </p:sp>
+      <p:pic>
+        <p:nvPicPr>
+          <p:cNvPr id="4" name="Content Placeholder 4"/>
+          <p:cNvPicPr>
+            <a:picLocks noGrp="1" noChangeAspect="1"/>
+          </p:cNvPicPr>
+          <p:nvPr>
+            <p:ph sz="half" idx="4294967295"/>
+          </p:nvPr>
+        </p:nvPicPr>
+        <p:blipFill>
+          <a:blip r:embed="rId2">
+            <a:extLst>
+              <a:ext uri="{28A0092B-C50C-407E-A947-70E740481C1C}">
+                <a14:useLocalDpi xmlns:a14="http://schemas.microsoft.com/office/drawing/2010/main" val="0"/>
+              </a:ext>
+            </a:extLst>
+          </a:blip>
+          <a:stretch>
+            <a:fillRect/>
+          </a:stretch>
+        </p:blipFill>
         <p:spPr>
           <a:xfrm>
-            <a:off x="669518" y="2149230"/>
-            <a:ext cx="8596668" cy="1320800"/>
+            <a:off x="3089520" y="2132148"/>
+            <a:ext cx="3886200" cy="2914651"/>
           </a:xfrm>
+          <a:prstGeom prst="rect">
+            <a:avLst/>
+          </a:prstGeom>
         </p:spPr>
-        <p:txBody>
-          <a:bodyPr/>
-          <a:lstStyle/>
-          <a:p>
-            <a:pPr algn="ctr"/>
-            <a:r>
-              <a:rPr lang="en-US" dirty="0" smtClean="0"/>
-              <a:t>Thank you for your attention!</a:t>
-            </a:r>
-            <a:endParaRPr lang="ru-RU" dirty="0"/>
-          </a:p>
-        </p:txBody>
-      </p:sp>
+      </p:pic>
     </p:spTree>
     <p:extLst>
       <p:ext uri="{BB962C8B-B14F-4D97-AF65-F5344CB8AC3E}">
-        <p14:creationId xmlns:p14="http://schemas.microsoft.com/office/powerpoint/2010/main" val="3087094628"/>
+        <p14:creationId xmlns:p14="http://schemas.microsoft.com/office/powerpoint/2010/main" val="633993582"/>
       </p:ext>
     </p:extLst>
   </p:cSld>

</xml_diff>

<commit_message>
foresight in my wok (1.3 v)
</commit_message>
<xml_diff>
--- a/Foresight_in_work/Foresight_methodologies.pptx
+++ b/Foresight_in_work/Foresight_methodologies.pptx
@@ -6,15 +6,19 @@
   </p:sldMasterIdLst>
   <p:sldIdLst>
     <p:sldId id="256" r:id="rId2"/>
-    <p:sldId id="259" r:id="rId3"/>
-    <p:sldId id="266" r:id="rId4"/>
-    <p:sldId id="260" r:id="rId5"/>
-    <p:sldId id="261" r:id="rId6"/>
-    <p:sldId id="262" r:id="rId7"/>
-    <p:sldId id="263" r:id="rId8"/>
-    <p:sldId id="267" r:id="rId9"/>
-    <p:sldId id="264" r:id="rId10"/>
-    <p:sldId id="265" r:id="rId11"/>
+    <p:sldId id="268" r:id="rId3"/>
+    <p:sldId id="269" r:id="rId4"/>
+    <p:sldId id="259" r:id="rId5"/>
+    <p:sldId id="266" r:id="rId6"/>
+    <p:sldId id="260" r:id="rId7"/>
+    <p:sldId id="270" r:id="rId8"/>
+    <p:sldId id="261" r:id="rId9"/>
+    <p:sldId id="262" r:id="rId10"/>
+    <p:sldId id="271" r:id="rId11"/>
+    <p:sldId id="263" r:id="rId12"/>
+    <p:sldId id="267" r:id="rId13"/>
+    <p:sldId id="264" r:id="rId14"/>
+    <p:sldId id="265" r:id="rId15"/>
   </p:sldIdLst>
   <p:sldSz cx="12192000" cy="6858000"/>
   <p:notesSz cx="6858000" cy="9144000"/>
@@ -115,7 +119,7 @@
   </p:defaultTextStyle>
   <p:extLst>
     <p:ext uri="{EFAFB233-063F-42B5-8137-9DF3F51BA10A}">
-      <p15:sldGuideLst xmlns:p15="http://schemas.microsoft.com/office/powerpoint/2012/main">
+      <p15:sldGuideLst xmlns:p15="http://schemas.microsoft.com/office/powerpoint/2012/main" xmlns="">
         <p15:guide id="1" orient="horz" pos="2160">
           <p15:clr>
             <a:srgbClr val="A4A3A4"/>
@@ -854,7 +858,7 @@
           <a:p>
             <a:fld id="{252F7152-2E34-4CF8-96E1-9C0B6BE1AFF1}" type="datetimeFigureOut">
               <a:rPr lang="ru-RU" smtClean="0"/>
-              <a:t>14.04.2015</a:t>
+              <a:t>15.04.2015</a:t>
             </a:fld>
             <a:endParaRPr lang="ru-RU"/>
           </a:p>
@@ -1105,7 +1109,7 @@
           <a:p>
             <a:fld id="{252F7152-2E34-4CF8-96E1-9C0B6BE1AFF1}" type="datetimeFigureOut">
               <a:rPr lang="ru-RU" smtClean="0"/>
-              <a:t>14.04.2015</a:t>
+              <a:t>15.04.2015</a:t>
             </a:fld>
             <a:endParaRPr lang="ru-RU"/>
           </a:p>
@@ -1419,7 +1423,7 @@
           <a:p>
             <a:fld id="{252F7152-2E34-4CF8-96E1-9C0B6BE1AFF1}" type="datetimeFigureOut">
               <a:rPr lang="ru-RU" smtClean="0"/>
-              <a:t>14.04.2015</a:t>
+              <a:t>15.04.2015</a:t>
             </a:fld>
             <a:endParaRPr lang="ru-RU"/>
           </a:p>
@@ -1760,7 +1764,7 @@
           <a:p>
             <a:fld id="{252F7152-2E34-4CF8-96E1-9C0B6BE1AFF1}" type="datetimeFigureOut">
               <a:rPr lang="ru-RU" smtClean="0"/>
-              <a:t>14.04.2015</a:t>
+              <a:t>15.04.2015</a:t>
             </a:fld>
             <a:endParaRPr lang="ru-RU"/>
           </a:p>
@@ -2074,7 +2078,7 @@
           <a:p>
             <a:fld id="{252F7152-2E34-4CF8-96E1-9C0B6BE1AFF1}" type="datetimeFigureOut">
               <a:rPr lang="ru-RU" smtClean="0"/>
-              <a:t>14.04.2015</a:t>
+              <a:t>15.04.2015</a:t>
             </a:fld>
             <a:endParaRPr lang="ru-RU"/>
           </a:p>
@@ -2467,7 +2471,7 @@
           <a:p>
             <a:fld id="{252F7152-2E34-4CF8-96E1-9C0B6BE1AFF1}" type="datetimeFigureOut">
               <a:rPr lang="ru-RU" smtClean="0"/>
-              <a:t>14.04.2015</a:t>
+              <a:t>15.04.2015</a:t>
             </a:fld>
             <a:endParaRPr lang="ru-RU"/>
           </a:p>
@@ -2637,7 +2641,7 @@
           <a:p>
             <a:fld id="{252F7152-2E34-4CF8-96E1-9C0B6BE1AFF1}" type="datetimeFigureOut">
               <a:rPr lang="ru-RU" smtClean="0"/>
-              <a:t>14.04.2015</a:t>
+              <a:t>15.04.2015</a:t>
             </a:fld>
             <a:endParaRPr lang="ru-RU"/>
           </a:p>
@@ -2817,7 +2821,7 @@
           <a:p>
             <a:fld id="{252F7152-2E34-4CF8-96E1-9C0B6BE1AFF1}" type="datetimeFigureOut">
               <a:rPr lang="ru-RU" smtClean="0"/>
-              <a:t>14.04.2015</a:t>
+              <a:t>15.04.2015</a:t>
             </a:fld>
             <a:endParaRPr lang="ru-RU"/>
           </a:p>
@@ -2993,7 +2997,7 @@
           <a:p>
             <a:fld id="{252F7152-2E34-4CF8-96E1-9C0B6BE1AFF1}" type="datetimeFigureOut">
               <a:rPr lang="ru-RU" smtClean="0"/>
-              <a:t>14.04.2015</a:t>
+              <a:t>15.04.2015</a:t>
             </a:fld>
             <a:endParaRPr lang="ru-RU"/>
           </a:p>
@@ -3240,7 +3244,7 @@
           <a:p>
             <a:fld id="{252F7152-2E34-4CF8-96E1-9C0B6BE1AFF1}" type="datetimeFigureOut">
               <a:rPr lang="ru-RU" smtClean="0"/>
-              <a:t>14.04.2015</a:t>
+              <a:t>15.04.2015</a:t>
             </a:fld>
             <a:endParaRPr lang="ru-RU"/>
           </a:p>
@@ -3472,7 +3476,7 @@
           <a:p>
             <a:fld id="{252F7152-2E34-4CF8-96E1-9C0B6BE1AFF1}" type="datetimeFigureOut">
               <a:rPr lang="ru-RU" smtClean="0"/>
-              <a:t>14.04.2015</a:t>
+              <a:t>15.04.2015</a:t>
             </a:fld>
             <a:endParaRPr lang="ru-RU"/>
           </a:p>
@@ -3846,7 +3850,7 @@
           <a:p>
             <a:fld id="{252F7152-2E34-4CF8-96E1-9C0B6BE1AFF1}" type="datetimeFigureOut">
               <a:rPr lang="ru-RU" smtClean="0"/>
-              <a:t>14.04.2015</a:t>
+              <a:t>15.04.2015</a:t>
             </a:fld>
             <a:endParaRPr lang="ru-RU"/>
           </a:p>
@@ -3969,7 +3973,7 @@
           <a:p>
             <a:fld id="{252F7152-2E34-4CF8-96E1-9C0B6BE1AFF1}" type="datetimeFigureOut">
               <a:rPr lang="ru-RU" smtClean="0"/>
-              <a:t>14.04.2015</a:t>
+              <a:t>15.04.2015</a:t>
             </a:fld>
             <a:endParaRPr lang="ru-RU"/>
           </a:p>
@@ -4064,7 +4068,7 @@
           <a:p>
             <a:fld id="{252F7152-2E34-4CF8-96E1-9C0B6BE1AFF1}" type="datetimeFigureOut">
               <a:rPr lang="ru-RU" smtClean="0"/>
-              <a:t>14.04.2015</a:t>
+              <a:t>15.04.2015</a:t>
             </a:fld>
             <a:endParaRPr lang="ru-RU"/>
           </a:p>
@@ -4319,7 +4323,7 @@
           <a:p>
             <a:fld id="{252F7152-2E34-4CF8-96E1-9C0B6BE1AFF1}" type="datetimeFigureOut">
               <a:rPr lang="ru-RU" smtClean="0"/>
-              <a:t>14.04.2015</a:t>
+              <a:t>15.04.2015</a:t>
             </a:fld>
             <a:endParaRPr lang="ru-RU"/>
           </a:p>
@@ -4582,7 +4586,7 @@
           <a:p>
             <a:fld id="{252F7152-2E34-4CF8-96E1-9C0B6BE1AFF1}" type="datetimeFigureOut">
               <a:rPr lang="ru-RU" smtClean="0"/>
-              <a:t>14.04.2015</a:t>
+              <a:t>15.04.2015</a:t>
             </a:fld>
             <a:endParaRPr lang="ru-RU"/>
           </a:p>
@@ -5325,7 +5329,7 @@
           <a:p>
             <a:fld id="{252F7152-2E34-4CF8-96E1-9C0B6BE1AFF1}" type="datetimeFigureOut">
               <a:rPr lang="ru-RU" smtClean="0"/>
-              <a:t>14.04.2015</a:t>
+              <a:t>15.04.2015</a:t>
             </a:fld>
             <a:endParaRPr lang="ru-RU"/>
           </a:p>
@@ -6000,6 +6004,637 @@
             <p:ph type="title"/>
           </p:nvPr>
         </p:nvSpPr>
+        <p:spPr/>
+        <p:txBody>
+          <a:bodyPr/>
+          <a:lstStyle/>
+          <a:p>
+            <a:pPr algn="ctr"/>
+            <a:r>
+              <a:rPr lang="en-US" dirty="0" smtClean="0"/>
+              <a:t>Social causes</a:t>
+            </a:r>
+            <a:endParaRPr lang="ru-RU" dirty="0"/>
+          </a:p>
+        </p:txBody>
+      </p:sp>
+      <p:sp>
+        <p:nvSpPr>
+          <p:cNvPr id="3" name="Прямоугольник 2"/>
+          <p:cNvSpPr/>
+          <p:nvPr/>
+        </p:nvSpPr>
+        <p:spPr>
+          <a:xfrm>
+            <a:off x="170917" y="2152906"/>
+            <a:ext cx="2287574" cy="646331"/>
+          </a:xfrm>
+          <a:prstGeom prst="rect">
+            <a:avLst/>
+          </a:prstGeom>
+        </p:spPr>
+        <p:txBody>
+          <a:bodyPr wrap="square">
+            <a:spAutoFit/>
+          </a:bodyPr>
+          <a:lstStyle/>
+          <a:p>
+            <a:pPr algn="ctr"/>
+            <a:r>
+              <a:rPr lang="en-US" dirty="0" smtClean="0"/>
+              <a:t>to Improve x-ray medicine </a:t>
+            </a:r>
+            <a:endParaRPr lang="ru-RU" dirty="0"/>
+          </a:p>
+        </p:txBody>
+      </p:sp>
+      <p:sp>
+        <p:nvSpPr>
+          <p:cNvPr id="5" name="Прямоугольник 4"/>
+          <p:cNvSpPr/>
+          <p:nvPr/>
+        </p:nvSpPr>
+        <p:spPr>
+          <a:xfrm>
+            <a:off x="170917" y="4622536"/>
+            <a:ext cx="1951175" cy="646331"/>
+          </a:xfrm>
+          <a:prstGeom prst="rect">
+            <a:avLst/>
+          </a:prstGeom>
+        </p:spPr>
+        <p:txBody>
+          <a:bodyPr wrap="none">
+            <a:spAutoFit/>
+          </a:bodyPr>
+          <a:lstStyle/>
+          <a:p>
+            <a:pPr algn="ctr"/>
+            <a:r>
+              <a:rPr lang="en-US" dirty="0" smtClean="0"/>
+              <a:t>to take </a:t>
+            </a:r>
+            <a:r>
+              <a:rPr lang="en-US" dirty="0"/>
+              <a:t>care </a:t>
+            </a:r>
+            <a:endParaRPr lang="en-US" dirty="0" smtClean="0"/>
+          </a:p>
+          <a:p>
+            <a:pPr algn="ctr"/>
+            <a:r>
+              <a:rPr lang="en-US" dirty="0" smtClean="0"/>
+              <a:t>of </a:t>
+            </a:r>
+            <a:r>
+              <a:rPr lang="en-US" dirty="0"/>
+              <a:t>elderly people</a:t>
+            </a:r>
+            <a:endParaRPr lang="ru-RU" dirty="0"/>
+          </a:p>
+        </p:txBody>
+      </p:sp>
+      <p:pic>
+        <p:nvPicPr>
+          <p:cNvPr id="2050" name="Picture 2" descr="http://www.csectioncomics.com/csectioncomics/images/fb-cover-photos/facebook-cover-photo-x-ray-c-section-comics.jpg"/>
+          <p:cNvPicPr>
+            <a:picLocks noChangeAspect="1" noChangeArrowheads="1"/>
+          </p:cNvPicPr>
+          <p:nvPr/>
+        </p:nvPicPr>
+        <p:blipFill>
+          <a:blip r:embed="rId2">
+            <a:extLst>
+              <a:ext uri="{28A0092B-C50C-407E-A947-70E740481C1C}">
+                <a14:useLocalDpi xmlns:a14="http://schemas.microsoft.com/office/drawing/2010/main" val="0"/>
+              </a:ext>
+            </a:extLst>
+          </a:blip>
+          <a:srcRect/>
+          <a:stretch>
+            <a:fillRect/>
+          </a:stretch>
+        </p:blipFill>
+        <p:spPr bwMode="auto">
+          <a:xfrm>
+            <a:off x="2330305" y="1412056"/>
+            <a:ext cx="6617142" cy="2449354"/>
+          </a:xfrm>
+          <a:prstGeom prst="rect">
+            <a:avLst/>
+          </a:prstGeom>
+          <a:noFill/>
+          <a:extLst>
+            <a:ext uri="{909E8E84-426E-40DD-AFC4-6F175D3DCCD1}">
+              <a14:hiddenFill xmlns:a14="http://schemas.microsoft.com/office/drawing/2010/main">
+                <a:solidFill>
+                  <a:srgbClr val="FFFFFF"/>
+                </a:solidFill>
+              </a14:hiddenFill>
+            </a:ext>
+          </a:extLst>
+        </p:spPr>
+      </p:pic>
+      <p:pic>
+        <p:nvPicPr>
+          <p:cNvPr id="2052" name="Picture 4" descr="http://www.hamdulayheartfoundation.com/wp-content/uploads/2014/10/prevention.jpg"/>
+          <p:cNvPicPr>
+            <a:picLocks noChangeAspect="1" noChangeArrowheads="1"/>
+          </p:cNvPicPr>
+          <p:nvPr/>
+        </p:nvPicPr>
+        <p:blipFill>
+          <a:blip r:embed="rId3">
+            <a:extLst>
+              <a:ext uri="{28A0092B-C50C-407E-A947-70E740481C1C}">
+                <a14:useLocalDpi xmlns:a14="http://schemas.microsoft.com/office/drawing/2010/main" val="0"/>
+              </a:ext>
+            </a:extLst>
+          </a:blip>
+          <a:srcRect/>
+          <a:stretch>
+            <a:fillRect/>
+          </a:stretch>
+        </p:blipFill>
+        <p:spPr bwMode="auto">
+          <a:xfrm>
+            <a:off x="3178054" y="4067006"/>
+            <a:ext cx="4631079" cy="2607065"/>
+          </a:xfrm>
+          <a:prstGeom prst="rect">
+            <a:avLst/>
+          </a:prstGeom>
+          <a:noFill/>
+          <a:extLst>
+            <a:ext uri="{909E8E84-426E-40DD-AFC4-6F175D3DCCD1}">
+              <a14:hiddenFill xmlns:a14="http://schemas.microsoft.com/office/drawing/2010/main">
+                <a:solidFill>
+                  <a:srgbClr val="FFFFFF"/>
+                </a:solidFill>
+              </a14:hiddenFill>
+            </a:ext>
+          </a:extLst>
+        </p:spPr>
+      </p:pic>
+    </p:spTree>
+    <p:extLst>
+      <p:ext uri="{BB962C8B-B14F-4D97-AF65-F5344CB8AC3E}">
+        <p14:creationId xmlns:p14="http://schemas.microsoft.com/office/powerpoint/2010/main" val="81821522"/>
+      </p:ext>
+    </p:extLst>
+  </p:cSld>
+  <p:clrMapOvr>
+    <a:masterClrMapping/>
+  </p:clrMapOvr>
+  <p:timing>
+    <p:tnLst>
+      <p:par>
+        <p:cTn id="1" dur="indefinite" restart="never" nodeType="tmRoot"/>
+      </p:par>
+    </p:tnLst>
+  </p:timing>
+</p:sld>
+</file>
+
+<file path=ppt/slides/slide11.xml><?xml version="1.0" encoding="utf-8"?>
+<p:sld xmlns:a="http://schemas.openxmlformats.org/drawingml/2006/main" xmlns:r="http://schemas.openxmlformats.org/officeDocument/2006/relationships" xmlns:p="http://schemas.openxmlformats.org/presentationml/2006/main">
+  <p:cSld>
+    <p:spTree>
+      <p:nvGrpSpPr>
+        <p:cNvPr id="1" name=""/>
+        <p:cNvGrpSpPr/>
+        <p:nvPr/>
+      </p:nvGrpSpPr>
+      <p:grpSpPr>
+        <a:xfrm>
+          <a:off x="0" y="0"/>
+          <a:ext cx="0" cy="0"/>
+          <a:chOff x="0" y="0"/>
+          <a:chExt cx="0" cy="0"/>
+        </a:xfrm>
+      </p:grpSpPr>
+      <p:sp>
+        <p:nvSpPr>
+          <p:cNvPr id="2" name="Заголовок 1"/>
+          <p:cNvSpPr>
+            <a:spLocks noGrp="1"/>
+          </p:cNvSpPr>
+          <p:nvPr>
+            <p:ph type="title"/>
+          </p:nvPr>
+        </p:nvSpPr>
+        <p:spPr/>
+        <p:txBody>
+          <a:bodyPr/>
+          <a:lstStyle/>
+          <a:p>
+            <a:pPr algn="ctr"/>
+            <a:r>
+              <a:rPr lang="en-US" dirty="0"/>
+              <a:t>Prospective Methods: what might happen?</a:t>
+            </a:r>
+            <a:endParaRPr lang="ru-RU" dirty="0"/>
+          </a:p>
+        </p:txBody>
+      </p:sp>
+      <p:pic>
+        <p:nvPicPr>
+          <p:cNvPr id="4" name="Рисунок 3"/>
+          <p:cNvPicPr>
+            <a:picLocks noChangeAspect="1"/>
+          </p:cNvPicPr>
+          <p:nvPr/>
+        </p:nvPicPr>
+        <p:blipFill>
+          <a:blip r:embed="rId2"/>
+          <a:stretch>
+            <a:fillRect/>
+          </a:stretch>
+        </p:blipFill>
+        <p:spPr>
+          <a:xfrm>
+            <a:off x="1541707" y="1930400"/>
+            <a:ext cx="7248525" cy="4638675"/>
+          </a:xfrm>
+          <a:prstGeom prst="rect">
+            <a:avLst/>
+          </a:prstGeom>
+        </p:spPr>
+      </p:pic>
+    </p:spTree>
+    <p:extLst>
+      <p:ext uri="{BB962C8B-B14F-4D97-AF65-F5344CB8AC3E}">
+        <p14:creationId xmlns:p14="http://schemas.microsoft.com/office/powerpoint/2010/main" val="2269226001"/>
+      </p:ext>
+    </p:extLst>
+  </p:cSld>
+  <p:clrMapOvr>
+    <a:masterClrMapping/>
+  </p:clrMapOvr>
+  <p:timing>
+    <p:tnLst>
+      <p:par>
+        <p:cTn id="1" dur="indefinite" restart="never" nodeType="tmRoot"/>
+      </p:par>
+    </p:tnLst>
+  </p:timing>
+</p:sld>
+</file>
+
+<file path=ppt/slides/slide12.xml><?xml version="1.0" encoding="utf-8"?>
+<p:sld xmlns:a="http://schemas.openxmlformats.org/drawingml/2006/main" xmlns:r="http://schemas.openxmlformats.org/officeDocument/2006/relationships" xmlns:p="http://schemas.openxmlformats.org/presentationml/2006/main">
+  <p:cSld>
+    <p:spTree>
+      <p:nvGrpSpPr>
+        <p:cNvPr id="1" name=""/>
+        <p:cNvGrpSpPr/>
+        <p:nvPr/>
+      </p:nvGrpSpPr>
+      <p:grpSpPr>
+        <a:xfrm>
+          <a:off x="0" y="0"/>
+          <a:ext cx="0" cy="0"/>
+          <a:chOff x="0" y="0"/>
+          <a:chExt cx="0" cy="0"/>
+        </a:xfrm>
+      </p:grpSpPr>
+      <p:sp>
+        <p:nvSpPr>
+          <p:cNvPr id="2" name="Заголовок 1"/>
+          <p:cNvSpPr>
+            <a:spLocks noGrp="1"/>
+          </p:cNvSpPr>
+          <p:nvPr>
+            <p:ph type="title"/>
+          </p:nvPr>
+        </p:nvSpPr>
+        <p:spPr/>
+        <p:txBody>
+          <a:bodyPr/>
+          <a:lstStyle/>
+          <a:p>
+            <a:pPr algn="ctr"/>
+            <a:r>
+              <a:rPr lang="en-US" dirty="0" smtClean="0"/>
+              <a:t>Three </a:t>
+            </a:r>
+            <a:r>
+              <a:rPr lang="en-US" dirty="0"/>
+              <a:t>ways of development the DXA</a:t>
+            </a:r>
+            <a:endParaRPr lang="ru-RU" dirty="0"/>
+          </a:p>
+        </p:txBody>
+      </p:sp>
+      <p:sp>
+        <p:nvSpPr>
+          <p:cNvPr id="3" name="TextBox 2"/>
+          <p:cNvSpPr txBox="1"/>
+          <p:nvPr/>
+        </p:nvSpPr>
+        <p:spPr>
+          <a:xfrm>
+            <a:off x="1101968" y="2203938"/>
+            <a:ext cx="5861539" cy="3139321"/>
+          </a:xfrm>
+          <a:prstGeom prst="rect">
+            <a:avLst/>
+          </a:prstGeom>
+          <a:noFill/>
+        </p:spPr>
+        <p:txBody>
+          <a:bodyPr wrap="square" rtlCol="0">
+            <a:spAutoFit/>
+          </a:bodyPr>
+          <a:lstStyle/>
+          <a:p>
+            <a:r>
+              <a:rPr lang="en-US" dirty="0" smtClean="0"/>
+              <a:t>Scenario 1</a:t>
+            </a:r>
+          </a:p>
+          <a:p>
+            <a:r>
+              <a:rPr lang="en-US" dirty="0" smtClean="0"/>
+              <a:t>We will use the </a:t>
+            </a:r>
+            <a:r>
+              <a:rPr lang="en-US" dirty="0" err="1" smtClean="0"/>
+              <a:t>CdTe</a:t>
+            </a:r>
+            <a:r>
+              <a:rPr lang="en-US" dirty="0" smtClean="0"/>
+              <a:t> detector with the good energy resolution and  low emission time</a:t>
+            </a:r>
+          </a:p>
+          <a:p>
+            <a:endParaRPr lang="en-US" dirty="0"/>
+          </a:p>
+          <a:p>
+            <a:r>
+              <a:rPr lang="en-US" dirty="0"/>
+              <a:t>Scenario </a:t>
+            </a:r>
+            <a:r>
+              <a:rPr lang="en-US" dirty="0" smtClean="0"/>
+              <a:t>2</a:t>
+            </a:r>
+            <a:endParaRPr lang="en-US" dirty="0"/>
+          </a:p>
+          <a:p>
+            <a:r>
+              <a:rPr lang="en-US" dirty="0"/>
+              <a:t>We will </a:t>
+            </a:r>
+            <a:r>
+              <a:rPr lang="en-US" dirty="0" smtClean="0"/>
+              <a:t>use the </a:t>
+            </a:r>
+            <a:r>
+              <a:rPr lang="en-US" dirty="0" err="1" smtClean="0"/>
+              <a:t>SiPM</a:t>
+            </a:r>
+            <a:r>
+              <a:rPr lang="en-US" dirty="0" smtClean="0"/>
+              <a:t>-scintillator detector with the worse energy </a:t>
+            </a:r>
+            <a:r>
+              <a:rPr lang="en-US" dirty="0"/>
+              <a:t>resolution </a:t>
+            </a:r>
+            <a:r>
+              <a:rPr lang="en-US" dirty="0" smtClean="0"/>
+              <a:t>but shorter emission time</a:t>
+            </a:r>
+          </a:p>
+          <a:p>
+            <a:endParaRPr lang="en-US" dirty="0"/>
+          </a:p>
+          <a:p>
+            <a:r>
+              <a:rPr lang="en-US" dirty="0"/>
+              <a:t>Scenario </a:t>
+            </a:r>
+            <a:r>
+              <a:rPr lang="en-US" dirty="0" smtClean="0"/>
+              <a:t>3</a:t>
+            </a:r>
+            <a:endParaRPr lang="en-US" dirty="0"/>
+          </a:p>
+          <a:p>
+            <a:r>
+              <a:rPr lang="en-US" dirty="0"/>
+              <a:t>We will use the </a:t>
+            </a:r>
+            <a:r>
+              <a:rPr lang="en-US" dirty="0" smtClean="0"/>
+              <a:t>combination of these detectors</a:t>
+            </a:r>
+            <a:endParaRPr lang="en-US" dirty="0"/>
+          </a:p>
+          <a:p>
+            <a:endParaRPr lang="ru-RU" dirty="0"/>
+          </a:p>
+        </p:txBody>
+      </p:sp>
+    </p:spTree>
+    <p:extLst>
+      <p:ext uri="{BB962C8B-B14F-4D97-AF65-F5344CB8AC3E}">
+        <p14:creationId xmlns:p14="http://schemas.microsoft.com/office/powerpoint/2010/main" val="2455233009"/>
+      </p:ext>
+    </p:extLst>
+  </p:cSld>
+  <p:clrMapOvr>
+    <a:masterClrMapping/>
+  </p:clrMapOvr>
+  <p:timing>
+    <p:tnLst>
+      <p:par>
+        <p:cTn id="1" dur="indefinite" restart="never" nodeType="tmRoot"/>
+      </p:par>
+    </p:tnLst>
+  </p:timing>
+</p:sld>
+</file>
+
+<file path=ppt/slides/slide13.xml><?xml version="1.0" encoding="utf-8"?>
+<p:sld xmlns:a="http://schemas.openxmlformats.org/drawingml/2006/main" xmlns:r="http://schemas.openxmlformats.org/officeDocument/2006/relationships" xmlns:p="http://schemas.openxmlformats.org/presentationml/2006/main">
+  <p:cSld>
+    <p:spTree>
+      <p:nvGrpSpPr>
+        <p:cNvPr id="1" name=""/>
+        <p:cNvGrpSpPr/>
+        <p:nvPr/>
+      </p:nvGrpSpPr>
+      <p:grpSpPr>
+        <a:xfrm>
+          <a:off x="0" y="0"/>
+          <a:ext cx="0" cy="0"/>
+          <a:chOff x="0" y="0"/>
+          <a:chExt cx="0" cy="0"/>
+        </a:xfrm>
+      </p:grpSpPr>
+      <p:sp>
+        <p:nvSpPr>
+          <p:cNvPr id="2" name="Заголовок 1"/>
+          <p:cNvSpPr>
+            <a:spLocks noGrp="1"/>
+          </p:cNvSpPr>
+          <p:nvPr>
+            <p:ph type="title"/>
+          </p:nvPr>
+        </p:nvSpPr>
+        <p:spPr/>
+        <p:txBody>
+          <a:bodyPr/>
+          <a:lstStyle/>
+          <a:p>
+            <a:pPr algn="ctr"/>
+            <a:r>
+              <a:rPr lang="en-US" dirty="0"/>
+              <a:t>Concluding Comments</a:t>
+            </a:r>
+            <a:endParaRPr lang="ru-RU" dirty="0"/>
+          </a:p>
+        </p:txBody>
+      </p:sp>
+      <p:pic>
+        <p:nvPicPr>
+          <p:cNvPr id="4" name="Content Placeholder 4"/>
+          <p:cNvPicPr>
+            <a:picLocks noGrp="1" noChangeAspect="1"/>
+          </p:cNvPicPr>
+          <p:nvPr>
+            <p:ph sz="half" idx="4294967295"/>
+          </p:nvPr>
+        </p:nvPicPr>
+        <p:blipFill>
+          <a:blip r:embed="rId2">
+            <a:extLst>
+              <a:ext uri="{28A0092B-C50C-407E-A947-70E740481C1C}">
+                <a14:useLocalDpi xmlns:a14="http://schemas.microsoft.com/office/drawing/2010/main" val="0"/>
+              </a:ext>
+            </a:extLst>
+          </a:blip>
+          <a:stretch>
+            <a:fillRect/>
+          </a:stretch>
+        </p:blipFill>
+        <p:spPr>
+          <a:xfrm>
+            <a:off x="2918604" y="1397210"/>
+            <a:ext cx="3886200" cy="2914651"/>
+          </a:xfrm>
+          <a:prstGeom prst="rect">
+            <a:avLst/>
+          </a:prstGeom>
+        </p:spPr>
+      </p:pic>
+      <p:sp>
+        <p:nvSpPr>
+          <p:cNvPr id="3" name="Прямоугольник 2"/>
+          <p:cNvSpPr/>
+          <p:nvPr/>
+        </p:nvSpPr>
+        <p:spPr>
+          <a:xfrm>
+            <a:off x="744166" y="4774032"/>
+            <a:ext cx="5798382" cy="369332"/>
+          </a:xfrm>
+          <a:prstGeom prst="rect">
+            <a:avLst/>
+          </a:prstGeom>
+        </p:spPr>
+        <p:txBody>
+          <a:bodyPr wrap="none">
+            <a:spAutoFit/>
+          </a:bodyPr>
+          <a:lstStyle/>
+          <a:p>
+            <a:r>
+              <a:rPr lang="en-US" dirty="0"/>
+              <a:t>I have examined the application of foresight methods </a:t>
+            </a:r>
+            <a:endParaRPr lang="ru-RU" dirty="0"/>
+          </a:p>
+        </p:txBody>
+      </p:sp>
+      <p:sp>
+        <p:nvSpPr>
+          <p:cNvPr id="5" name="Прямоугольник 4"/>
+          <p:cNvSpPr/>
+          <p:nvPr/>
+        </p:nvSpPr>
+        <p:spPr>
+          <a:xfrm>
+            <a:off x="744166" y="5261141"/>
+            <a:ext cx="3735318" cy="369332"/>
+          </a:xfrm>
+          <a:prstGeom prst="rect">
+            <a:avLst/>
+          </a:prstGeom>
+        </p:spPr>
+        <p:txBody>
+          <a:bodyPr wrap="none">
+            <a:spAutoFit/>
+          </a:bodyPr>
+          <a:lstStyle/>
+          <a:p>
+            <a:r>
+              <a:rPr lang="en-US" dirty="0"/>
+              <a:t>This work really was useful for me</a:t>
+            </a:r>
+            <a:endParaRPr lang="ru-RU" dirty="0"/>
+          </a:p>
+        </p:txBody>
+      </p:sp>
+    </p:spTree>
+    <p:extLst>
+      <p:ext uri="{BB962C8B-B14F-4D97-AF65-F5344CB8AC3E}">
+        <p14:creationId xmlns:p14="http://schemas.microsoft.com/office/powerpoint/2010/main" val="633993582"/>
+      </p:ext>
+    </p:extLst>
+  </p:cSld>
+  <p:clrMapOvr>
+    <a:masterClrMapping/>
+  </p:clrMapOvr>
+  <p:timing>
+    <p:tnLst>
+      <p:par>
+        <p:cTn id="1" dur="indefinite" restart="never" nodeType="tmRoot"/>
+      </p:par>
+    </p:tnLst>
+  </p:timing>
+</p:sld>
+</file>
+
+<file path=ppt/slides/slide14.xml><?xml version="1.0" encoding="utf-8"?>
+<p:sld xmlns:a="http://schemas.openxmlformats.org/drawingml/2006/main" xmlns:r="http://schemas.openxmlformats.org/officeDocument/2006/relationships" xmlns:p="http://schemas.openxmlformats.org/presentationml/2006/main">
+  <p:cSld>
+    <p:spTree>
+      <p:nvGrpSpPr>
+        <p:cNvPr id="1" name=""/>
+        <p:cNvGrpSpPr/>
+        <p:nvPr/>
+      </p:nvGrpSpPr>
+      <p:grpSpPr>
+        <a:xfrm>
+          <a:off x="0" y="0"/>
+          <a:ext cx="0" cy="0"/>
+          <a:chOff x="0" y="0"/>
+          <a:chExt cx="0" cy="0"/>
+        </a:xfrm>
+      </p:grpSpPr>
+      <p:sp>
+        <p:nvSpPr>
+          <p:cNvPr id="2" name="Заголовок 1"/>
+          <p:cNvSpPr>
+            <a:spLocks noGrp="1"/>
+          </p:cNvSpPr>
+          <p:nvPr>
+            <p:ph type="title"/>
+          </p:nvPr>
+        </p:nvSpPr>
         <p:spPr>
           <a:xfrm>
             <a:off x="669518" y="2149230"/>
@@ -6074,7 +6709,296 @@
             <a:pPr algn="ctr"/>
             <a:r>
               <a:rPr lang="en-US" dirty="0"/>
-              <a:t>Foresight Methodologies</a:t>
+              <a:t>C</a:t>
+            </a:r>
+            <a:r>
+              <a:rPr lang="en-US" dirty="0" smtClean="0"/>
+              <a:t>ontent</a:t>
+            </a:r>
+            <a:endParaRPr lang="ru-RU" dirty="0"/>
+          </a:p>
+        </p:txBody>
+      </p:sp>
+      <p:sp>
+        <p:nvSpPr>
+          <p:cNvPr id="3" name="Объект 2"/>
+          <p:cNvSpPr>
+            <a:spLocks noGrp="1"/>
+          </p:cNvSpPr>
+          <p:nvPr>
+            <p:ph idx="1"/>
+          </p:nvPr>
+        </p:nvSpPr>
+        <p:spPr/>
+        <p:txBody>
+          <a:bodyPr/>
+          <a:lstStyle/>
+          <a:p>
+            <a:r>
+              <a:rPr lang="en-US" dirty="0" smtClean="0"/>
+              <a:t>Introduction (generic foresight model)</a:t>
+            </a:r>
+          </a:p>
+          <a:p>
+            <a:r>
+              <a:rPr lang="en-US" dirty="0" smtClean="0"/>
+              <a:t>Input method</a:t>
+            </a:r>
+          </a:p>
+          <a:p>
+            <a:r>
+              <a:rPr lang="en-US" dirty="0" smtClean="0"/>
+              <a:t>Analysis method</a:t>
+            </a:r>
+          </a:p>
+          <a:p>
+            <a:r>
+              <a:rPr lang="en-US" dirty="0" smtClean="0"/>
+              <a:t>Prospection method</a:t>
+            </a:r>
+          </a:p>
+          <a:p>
+            <a:r>
+              <a:rPr lang="en-US" dirty="0"/>
+              <a:t>Concluding </a:t>
+            </a:r>
+            <a:r>
+              <a:rPr lang="en-US" dirty="0" smtClean="0"/>
+              <a:t>comments</a:t>
+            </a:r>
+          </a:p>
+        </p:txBody>
+      </p:sp>
+    </p:spTree>
+    <p:extLst>
+      <p:ext uri="{BB962C8B-B14F-4D97-AF65-F5344CB8AC3E}">
+        <p14:creationId xmlns:p14="http://schemas.microsoft.com/office/powerpoint/2010/main" val="55726168"/>
+      </p:ext>
+    </p:extLst>
+  </p:cSld>
+  <p:clrMapOvr>
+    <a:masterClrMapping/>
+  </p:clrMapOvr>
+</p:sld>
+</file>
+
+<file path=ppt/slides/slide3.xml><?xml version="1.0" encoding="utf-8"?>
+<p:sld xmlns:a="http://schemas.openxmlformats.org/drawingml/2006/main" xmlns:r="http://schemas.openxmlformats.org/officeDocument/2006/relationships" xmlns:p="http://schemas.openxmlformats.org/presentationml/2006/main">
+  <p:cSld>
+    <p:spTree>
+      <p:nvGrpSpPr>
+        <p:cNvPr id="1" name=""/>
+        <p:cNvGrpSpPr/>
+        <p:nvPr/>
+      </p:nvGrpSpPr>
+      <p:grpSpPr>
+        <a:xfrm>
+          <a:off x="0" y="0"/>
+          <a:ext cx="0" cy="0"/>
+          <a:chOff x="0" y="0"/>
+          <a:chExt cx="0" cy="0"/>
+        </a:xfrm>
+      </p:grpSpPr>
+      <p:sp>
+        <p:nvSpPr>
+          <p:cNvPr id="2" name="Заголовок 1"/>
+          <p:cNvSpPr>
+            <a:spLocks noGrp="1"/>
+          </p:cNvSpPr>
+          <p:nvPr>
+            <p:ph type="title"/>
+          </p:nvPr>
+        </p:nvSpPr>
+        <p:spPr/>
+        <p:txBody>
+          <a:bodyPr/>
+          <a:lstStyle/>
+          <a:p>
+            <a:pPr algn="ctr"/>
+            <a:r>
+              <a:rPr lang="en-US" dirty="0"/>
+              <a:t>C</a:t>
+            </a:r>
+            <a:r>
+              <a:rPr lang="en-US" dirty="0" smtClean="0"/>
+              <a:t>ontent</a:t>
+            </a:r>
+            <a:endParaRPr lang="ru-RU" dirty="0"/>
+          </a:p>
+        </p:txBody>
+      </p:sp>
+      <p:sp>
+        <p:nvSpPr>
+          <p:cNvPr id="3" name="Объект 2"/>
+          <p:cNvSpPr>
+            <a:spLocks noGrp="1"/>
+          </p:cNvSpPr>
+          <p:nvPr>
+            <p:ph idx="1"/>
+          </p:nvPr>
+        </p:nvSpPr>
+        <p:spPr/>
+        <p:txBody>
+          <a:bodyPr/>
+          <a:lstStyle/>
+          <a:p>
+            <a:r>
+              <a:rPr lang="en-US" dirty="0" smtClean="0"/>
+              <a:t>Introduction (generic foresight model)</a:t>
+            </a:r>
+          </a:p>
+          <a:p>
+            <a:r>
+              <a:rPr lang="en-US" dirty="0" smtClean="0"/>
+              <a:t>Input method</a:t>
+            </a:r>
+          </a:p>
+          <a:p>
+            <a:r>
+              <a:rPr lang="en-US" dirty="0" smtClean="0"/>
+              <a:t>Analysis method</a:t>
+            </a:r>
+          </a:p>
+          <a:p>
+            <a:r>
+              <a:rPr lang="en-US" dirty="0" smtClean="0"/>
+              <a:t>Prospection method</a:t>
+            </a:r>
+          </a:p>
+          <a:p>
+            <a:r>
+              <a:rPr lang="en-US" dirty="0"/>
+              <a:t>Concluding </a:t>
+            </a:r>
+            <a:r>
+              <a:rPr lang="en-US" dirty="0" smtClean="0"/>
+              <a:t>comments</a:t>
+            </a:r>
+          </a:p>
+        </p:txBody>
+      </p:sp>
+      <p:sp>
+        <p:nvSpPr>
+          <p:cNvPr id="4" name="Овальная выноска 3"/>
+          <p:cNvSpPr/>
+          <p:nvPr/>
+        </p:nvSpPr>
+        <p:spPr>
+          <a:xfrm>
+            <a:off x="5529128" y="1538243"/>
+            <a:ext cx="3717421" cy="1538243"/>
+          </a:xfrm>
+          <a:prstGeom prst="wedgeEllipseCallout">
+            <a:avLst>
+              <a:gd name="adj1" fmla="val -68649"/>
+              <a:gd name="adj2" fmla="val 74722"/>
+            </a:avLst>
+          </a:prstGeom>
+        </p:spPr>
+        <p:style>
+          <a:lnRef idx="2">
+            <a:schemeClr val="accent1">
+              <a:shade val="50000"/>
+            </a:schemeClr>
+          </a:lnRef>
+          <a:fillRef idx="1">
+            <a:schemeClr val="accent1"/>
+          </a:fillRef>
+          <a:effectRef idx="0">
+            <a:schemeClr val="accent1"/>
+          </a:effectRef>
+          <a:fontRef idx="minor">
+            <a:schemeClr val="lt1"/>
+          </a:fontRef>
+        </p:style>
+        <p:txBody>
+          <a:bodyPr rtlCol="0" anchor="ctr"/>
+          <a:lstStyle/>
+          <a:p>
+            <a:pPr algn="ctr"/>
+            <a:endParaRPr lang="ru-RU"/>
+          </a:p>
+        </p:txBody>
+      </p:sp>
+      <p:sp>
+        <p:nvSpPr>
+          <p:cNvPr id="5" name="TextBox 4"/>
+          <p:cNvSpPr txBox="1"/>
+          <p:nvPr/>
+        </p:nvSpPr>
+        <p:spPr>
+          <a:xfrm>
+            <a:off x="6768268" y="2122698"/>
+            <a:ext cx="1239140" cy="369332"/>
+          </a:xfrm>
+          <a:prstGeom prst="rect">
+            <a:avLst/>
+          </a:prstGeom>
+          <a:noFill/>
+        </p:spPr>
+        <p:txBody>
+          <a:bodyPr wrap="square" rtlCol="0">
+            <a:spAutoFit/>
+          </a:bodyPr>
+          <a:lstStyle/>
+          <a:p>
+            <a:r>
+              <a:rPr lang="en-US" dirty="0" smtClean="0"/>
+              <a:t>5 minutes</a:t>
+            </a:r>
+            <a:endParaRPr lang="ru-RU" dirty="0"/>
+          </a:p>
+        </p:txBody>
+      </p:sp>
+    </p:spTree>
+    <p:extLst>
+      <p:ext uri="{BB962C8B-B14F-4D97-AF65-F5344CB8AC3E}">
+        <p14:creationId xmlns:p14="http://schemas.microsoft.com/office/powerpoint/2010/main" val="1181095812"/>
+      </p:ext>
+    </p:extLst>
+  </p:cSld>
+  <p:clrMapOvr>
+    <a:masterClrMapping/>
+  </p:clrMapOvr>
+</p:sld>
+</file>
+
+<file path=ppt/slides/slide4.xml><?xml version="1.0" encoding="utf-8"?>
+<p:sld xmlns:a="http://schemas.openxmlformats.org/drawingml/2006/main" xmlns:r="http://schemas.openxmlformats.org/officeDocument/2006/relationships" xmlns:p="http://schemas.openxmlformats.org/presentationml/2006/main">
+  <p:cSld>
+    <p:spTree>
+      <p:nvGrpSpPr>
+        <p:cNvPr id="1" name=""/>
+        <p:cNvGrpSpPr/>
+        <p:nvPr/>
+      </p:nvGrpSpPr>
+      <p:grpSpPr>
+        <a:xfrm>
+          <a:off x="0" y="0"/>
+          <a:ext cx="0" cy="0"/>
+          <a:chOff x="0" y="0"/>
+          <a:chExt cx="0" cy="0"/>
+        </a:xfrm>
+      </p:grpSpPr>
+      <p:sp>
+        <p:nvSpPr>
+          <p:cNvPr id="2" name="Заголовок 1"/>
+          <p:cNvSpPr>
+            <a:spLocks noGrp="1"/>
+          </p:cNvSpPr>
+          <p:nvPr>
+            <p:ph type="title"/>
+          </p:nvPr>
+        </p:nvSpPr>
+        <p:spPr/>
+        <p:txBody>
+          <a:bodyPr/>
+          <a:lstStyle/>
+          <a:p>
+            <a:pPr algn="ctr"/>
+            <a:r>
+              <a:rPr lang="en-US" dirty="0" smtClean="0"/>
+              <a:t>A generic foresight model</a:t>
             </a:r>
             <a:endParaRPr lang="ru-RU" dirty="0"/>
           </a:p>
@@ -6124,7 +7048,7 @@
 </p:sld>
 </file>
 
-<file path=ppt/slides/slide3.xml><?xml version="1.0" encoding="utf-8"?>
+<file path=ppt/slides/slide5.xml><?xml version="1.0" encoding="utf-8"?>
 <p:sld xmlns:a="http://schemas.openxmlformats.org/drawingml/2006/main" xmlns:r="http://schemas.openxmlformats.org/officeDocument/2006/relationships" xmlns:p="http://schemas.openxmlformats.org/presentationml/2006/main">
   <p:cSld>
     <p:spTree>
@@ -6209,7 +7133,7 @@
 </p:sld>
 </file>
 
-<file path=ppt/slides/slide4.xml><?xml version="1.0" encoding="utf-8"?>
+<file path=ppt/slides/slide6.xml><?xml version="1.0" encoding="utf-8"?>
 <p:sld xmlns:a="http://schemas.openxmlformats.org/drawingml/2006/main" xmlns:r="http://schemas.openxmlformats.org/officeDocument/2006/relationships" xmlns:p="http://schemas.openxmlformats.org/presentationml/2006/main">
   <p:cSld>
     <p:spTree>
@@ -6697,7 +7621,7 @@
 </p:sld>
 </file>
 
-<file path=ppt/slides/slide5.xml><?xml version="1.0" encoding="utf-8"?>
+<file path=ppt/slides/slide7.xml><?xml version="1.0" encoding="utf-8"?>
 <p:sld xmlns:a="http://schemas.openxmlformats.org/drawingml/2006/main" xmlns:r="http://schemas.openxmlformats.org/officeDocument/2006/relationships" xmlns:p="http://schemas.openxmlformats.org/presentationml/2006/main">
   <p:cSld>
     <p:spTree>
@@ -6765,177 +7689,7 @@
     </p:spTree>
     <p:extLst>
       <p:ext uri="{BB962C8B-B14F-4D97-AF65-F5344CB8AC3E}">
-        <p14:creationId xmlns:p14="http://schemas.microsoft.com/office/powerpoint/2010/main" val="659714967"/>
-      </p:ext>
-    </p:extLst>
-  </p:cSld>
-  <p:clrMapOvr>
-    <a:masterClrMapping/>
-  </p:clrMapOvr>
-  <p:timing>
-    <p:tnLst>
-      <p:par>
-        <p:cTn id="1" dur="indefinite" restart="never" nodeType="tmRoot"/>
-      </p:par>
-    </p:tnLst>
-  </p:timing>
-</p:sld>
-</file>
-
-<file path=ppt/slides/slide6.xml><?xml version="1.0" encoding="utf-8"?>
-<p:sld xmlns:a="http://schemas.openxmlformats.org/drawingml/2006/main" xmlns:r="http://schemas.openxmlformats.org/officeDocument/2006/relationships" xmlns:p="http://schemas.openxmlformats.org/presentationml/2006/main">
-  <p:cSld>
-    <p:spTree>
-      <p:nvGrpSpPr>
-        <p:cNvPr id="1" name=""/>
-        <p:cNvGrpSpPr/>
-        <p:nvPr/>
-      </p:nvGrpSpPr>
-      <p:grpSpPr>
-        <a:xfrm>
-          <a:off x="0" y="0"/>
-          <a:ext cx="0" cy="0"/>
-          <a:chOff x="0" y="0"/>
-          <a:chExt cx="0" cy="0"/>
-        </a:xfrm>
-      </p:grpSpPr>
-      <p:sp>
-        <p:nvSpPr>
-          <p:cNvPr id="2" name="Заголовок 1"/>
-          <p:cNvSpPr>
-            <a:spLocks noGrp="1"/>
-          </p:cNvSpPr>
-          <p:nvPr>
-            <p:ph type="title"/>
-          </p:nvPr>
-        </p:nvSpPr>
-        <p:spPr/>
-        <p:txBody>
-          <a:bodyPr/>
-          <a:lstStyle/>
-          <a:p>
-            <a:pPr algn="ctr"/>
-            <a:r>
-              <a:rPr lang="en-US" dirty="0"/>
-              <a:t>Interpretive Methods: what’s really happening?</a:t>
-            </a:r>
-            <a:endParaRPr lang="ru-RU" dirty="0"/>
-          </a:p>
-        </p:txBody>
-      </p:sp>
-      <p:pic>
-        <p:nvPicPr>
-          <p:cNvPr id="4" name="Рисунок 3"/>
-          <p:cNvPicPr>
-            <a:picLocks noChangeAspect="1"/>
-          </p:cNvPicPr>
-          <p:nvPr/>
-        </p:nvPicPr>
-        <p:blipFill>
-          <a:blip r:embed="rId2"/>
-          <a:stretch>
-            <a:fillRect/>
-          </a:stretch>
-        </p:blipFill>
-        <p:spPr>
-          <a:xfrm>
-            <a:off x="1256974" y="2105929"/>
-            <a:ext cx="7437387" cy="4265685"/>
-          </a:xfrm>
-          <a:prstGeom prst="rect">
-            <a:avLst/>
-          </a:prstGeom>
-        </p:spPr>
-      </p:pic>
-    </p:spTree>
-    <p:extLst>
-      <p:ext uri="{BB962C8B-B14F-4D97-AF65-F5344CB8AC3E}">
-        <p14:creationId xmlns:p14="http://schemas.microsoft.com/office/powerpoint/2010/main" val="3772926769"/>
-      </p:ext>
-    </p:extLst>
-  </p:cSld>
-  <p:clrMapOvr>
-    <a:masterClrMapping/>
-  </p:clrMapOvr>
-  <p:timing>
-    <p:tnLst>
-      <p:par>
-        <p:cTn id="1" dur="indefinite" restart="never" nodeType="tmRoot"/>
-      </p:par>
-    </p:tnLst>
-  </p:timing>
-</p:sld>
-</file>
-
-<file path=ppt/slides/slide7.xml><?xml version="1.0" encoding="utf-8"?>
-<p:sld xmlns:a="http://schemas.openxmlformats.org/drawingml/2006/main" xmlns:r="http://schemas.openxmlformats.org/officeDocument/2006/relationships" xmlns:p="http://schemas.openxmlformats.org/presentationml/2006/main">
-  <p:cSld>
-    <p:spTree>
-      <p:nvGrpSpPr>
-        <p:cNvPr id="1" name=""/>
-        <p:cNvGrpSpPr/>
-        <p:nvPr/>
-      </p:nvGrpSpPr>
-      <p:grpSpPr>
-        <a:xfrm>
-          <a:off x="0" y="0"/>
-          <a:ext cx="0" cy="0"/>
-          <a:chOff x="0" y="0"/>
-          <a:chExt cx="0" cy="0"/>
-        </a:xfrm>
-      </p:grpSpPr>
-      <p:sp>
-        <p:nvSpPr>
-          <p:cNvPr id="2" name="Заголовок 1"/>
-          <p:cNvSpPr>
-            <a:spLocks noGrp="1"/>
-          </p:cNvSpPr>
-          <p:nvPr>
-            <p:ph type="title"/>
-          </p:nvPr>
-        </p:nvSpPr>
-        <p:spPr/>
-        <p:txBody>
-          <a:bodyPr/>
-          <a:lstStyle/>
-          <a:p>
-            <a:pPr algn="ctr"/>
-            <a:r>
-              <a:rPr lang="en-US" dirty="0"/>
-              <a:t>Prospective Methods: what might happen?</a:t>
-            </a:r>
-            <a:endParaRPr lang="ru-RU" dirty="0"/>
-          </a:p>
-        </p:txBody>
-      </p:sp>
-      <p:pic>
-        <p:nvPicPr>
-          <p:cNvPr id="4" name="Рисунок 3"/>
-          <p:cNvPicPr>
-            <a:picLocks noChangeAspect="1"/>
-          </p:cNvPicPr>
-          <p:nvPr/>
-        </p:nvPicPr>
-        <p:blipFill>
-          <a:blip r:embed="rId2"/>
-          <a:stretch>
-            <a:fillRect/>
-          </a:stretch>
-        </p:blipFill>
-        <p:spPr>
-          <a:xfrm>
-            <a:off x="1541707" y="1930400"/>
-            <a:ext cx="7248525" cy="4638675"/>
-          </a:xfrm>
-          <a:prstGeom prst="rect">
-            <a:avLst/>
-          </a:prstGeom>
-        </p:spPr>
-      </p:pic>
-    </p:spTree>
-    <p:extLst>
-      <p:ext uri="{BB962C8B-B14F-4D97-AF65-F5344CB8AC3E}">
-        <p14:creationId xmlns:p14="http://schemas.microsoft.com/office/powerpoint/2010/main" val="2269226001"/>
+        <p14:creationId xmlns:p14="http://schemas.microsoft.com/office/powerpoint/2010/main" val="2519219659"/>
       </p:ext>
     </p:extLst>
   </p:cSld>
@@ -6986,128 +7740,173 @@
           <a:p>
             <a:pPr algn="ctr"/>
             <a:r>
+              <a:rPr lang="en-US" dirty="0" smtClean="0"/>
+              <a:t>DXA is the </a:t>
+            </a:r>
+            <a:r>
               <a:rPr lang="en-US" dirty="0"/>
-              <a:t>Prospective Methods: what might happen?</a:t>
+              <a:t>“gold standard</a:t>
+            </a:r>
+            <a:r>
+              <a:rPr lang="en-US" dirty="0" smtClean="0"/>
+              <a:t>”, but …</a:t>
             </a:r>
             <a:endParaRPr lang="ru-RU" dirty="0"/>
           </a:p>
         </p:txBody>
       </p:sp>
-      <p:sp>
-        <p:nvSpPr>
-          <p:cNvPr id="3" name="TextBox 2"/>
-          <p:cNvSpPr txBox="1"/>
+      <p:pic>
+        <p:nvPicPr>
+          <p:cNvPr id="1026" name="Picture 2" descr="http://www.amptek.com/wp-content/uploads/2013/12/cdte_5.png"/>
+          <p:cNvPicPr>
+            <a:picLocks noChangeAspect="1" noChangeArrowheads="1"/>
+          </p:cNvPicPr>
           <p:nvPr/>
-        </p:nvSpPr>
-        <p:spPr>
+        </p:nvPicPr>
+        <p:blipFill>
+          <a:blip r:embed="rId2">
+            <a:extLst>
+              <a:ext uri="{28A0092B-C50C-407E-A947-70E740481C1C}">
+                <a14:useLocalDpi xmlns:a14="http://schemas.microsoft.com/office/drawing/2010/main" val="0"/>
+              </a:ext>
+            </a:extLst>
+          </a:blip>
+          <a:srcRect/>
+          <a:stretch>
+            <a:fillRect/>
+          </a:stretch>
+        </p:blipFill>
+        <p:spPr bwMode="auto">
           <a:xfrm>
-            <a:off x="1101968" y="2203938"/>
-            <a:ext cx="5861539" cy="3139321"/>
+            <a:off x="4709732" y="1509070"/>
+            <a:ext cx="4367156" cy="2650088"/>
           </a:xfrm>
           <a:prstGeom prst="rect">
             <a:avLst/>
           </a:prstGeom>
           <a:noFill/>
+          <a:extLst>
+            <a:ext uri="{909E8E84-426E-40DD-AFC4-6F175D3DCCD1}">
+              <a14:hiddenFill xmlns:a14="http://schemas.microsoft.com/office/drawing/2010/main">
+                <a:solidFill>
+                  <a:srgbClr val="FFFFFF"/>
+                </a:solidFill>
+              </a14:hiddenFill>
+            </a:ext>
+          </a:extLst>
         </p:spPr>
-        <p:txBody>
-          <a:bodyPr wrap="square" rtlCol="0">
+      </p:pic>
+      <p:sp>
+        <p:nvSpPr>
+          <p:cNvPr id="3" name="Прямоугольник 2"/>
+          <p:cNvSpPr/>
+          <p:nvPr/>
+        </p:nvSpPr>
+        <p:spPr>
+          <a:xfrm>
+            <a:off x="1088228" y="2464782"/>
+            <a:ext cx="3621504" cy="369332"/>
+          </a:xfrm>
+          <a:prstGeom prst="rect">
+            <a:avLst/>
+          </a:prstGeom>
+        </p:spPr>
+        <p:txBody>
+          <a:bodyPr wrap="none">
             <a:spAutoFit/>
           </a:bodyPr>
           <a:lstStyle/>
           <a:p>
             <a:r>
+              <a:rPr lang="en-US" dirty="0"/>
+              <a:t>the better </a:t>
+            </a:r>
+            <a:r>
               <a:rPr lang="en-US" dirty="0" smtClean="0"/>
-              <a:t>Scenario 1</a:t>
-            </a:r>
-          </a:p>
+              <a:t>the energy resolution,</a:t>
+            </a:r>
+            <a:endParaRPr lang="ru-RU" dirty="0"/>
+          </a:p>
+        </p:txBody>
+      </p:sp>
+      <p:sp>
+        <p:nvSpPr>
+          <p:cNvPr id="4" name="Прямоугольник 3"/>
+          <p:cNvSpPr/>
+          <p:nvPr/>
+        </p:nvSpPr>
+        <p:spPr>
+          <a:xfrm>
+            <a:off x="1104258" y="4719689"/>
+            <a:ext cx="3589444" cy="369332"/>
+          </a:xfrm>
+          <a:prstGeom prst="rect">
+            <a:avLst/>
+          </a:prstGeom>
+        </p:spPr>
+        <p:txBody>
+          <a:bodyPr wrap="none">
+            <a:spAutoFit/>
+          </a:bodyPr>
+          <a:lstStyle/>
           <a:p>
             <a:r>
               <a:rPr lang="en-US" dirty="0" smtClean="0"/>
-              <a:t>We will use the </a:t>
-            </a:r>
-            <a:r>
-              <a:rPr lang="en-US" dirty="0" err="1" smtClean="0"/>
-              <a:t>CdTe</a:t>
-            </a:r>
-            <a:r>
-              <a:rPr lang="en-US" dirty="0" smtClean="0"/>
-              <a:t> detector with the good energy resolution and  low emission time</a:t>
-            </a:r>
-          </a:p>
-          <a:p>
-            <a:endParaRPr lang="en-US" dirty="0"/>
-          </a:p>
-          <a:p>
+              <a:t>the </a:t>
+            </a:r>
             <a:r>
               <a:rPr lang="en-US" dirty="0"/>
-              <a:t>Scenario </a:t>
-            </a:r>
-            <a:r>
-              <a:rPr lang="en-US" dirty="0" smtClean="0"/>
-              <a:t>2</a:t>
-            </a:r>
-            <a:endParaRPr lang="en-US" dirty="0"/>
-          </a:p>
-          <a:p>
-            <a:r>
-              <a:rPr lang="en-US" dirty="0"/>
-              <a:t>We will </a:t>
-            </a:r>
-            <a:r>
-              <a:rPr lang="en-US" dirty="0" smtClean="0"/>
-              <a:t>use the </a:t>
-            </a:r>
-            <a:r>
-              <a:rPr lang="en-US" dirty="0" err="1" smtClean="0"/>
-              <a:t>SiPM</a:t>
-            </a:r>
-            <a:r>
-              <a:rPr lang="en-US" dirty="0" smtClean="0"/>
-              <a:t>-scintillator detector with the worse energy </a:t>
-            </a:r>
-            <a:r>
-              <a:rPr lang="en-US" dirty="0"/>
-              <a:t>resolution </a:t>
-            </a:r>
-            <a:r>
-              <a:rPr lang="en-US" dirty="0" smtClean="0"/>
-              <a:t>but shorter emission time</a:t>
-            </a:r>
-          </a:p>
-          <a:p>
-            <a:endParaRPr lang="en-US" dirty="0"/>
-          </a:p>
-          <a:p>
-            <a:r>
-              <a:rPr lang="en-US" dirty="0"/>
-              <a:t>Scenario </a:t>
-            </a:r>
-            <a:r>
-              <a:rPr lang="en-US" dirty="0" smtClean="0"/>
-              <a:t>3</a:t>
-            </a:r>
-            <a:endParaRPr lang="en-US" dirty="0"/>
-          </a:p>
-          <a:p>
-            <a:r>
-              <a:rPr lang="en-US" dirty="0"/>
-              <a:t>We will use the </a:t>
-            </a:r>
-            <a:r>
-              <a:rPr lang="en-US" dirty="0" smtClean="0"/>
-              <a:t>combination of these detectors</a:t>
-            </a:r>
-            <a:endParaRPr lang="en-US" dirty="0"/>
-          </a:p>
-          <a:p>
+              <a:t>lower dose a person receives</a:t>
+            </a:r>
             <a:endParaRPr lang="ru-RU" dirty="0"/>
           </a:p>
         </p:txBody>
       </p:sp>
+      <p:pic>
+        <p:nvPicPr>
+          <p:cNvPr id="1028" name="Picture 4" descr="http://chirana-east.ru/files/smoking/7.jpg"/>
+          <p:cNvPicPr>
+            <a:picLocks noChangeAspect="1" noChangeArrowheads="1"/>
+          </p:cNvPicPr>
+          <p:nvPr/>
+        </p:nvPicPr>
+        <p:blipFill>
+          <a:blip r:embed="rId3" cstate="print">
+            <a:extLst>
+              <a:ext uri="{28A0092B-C50C-407E-A947-70E740481C1C}">
+                <a14:useLocalDpi xmlns:a14="http://schemas.microsoft.com/office/drawing/2010/main" val="0"/>
+              </a:ext>
+            </a:extLst>
+          </a:blip>
+          <a:srcRect/>
+          <a:stretch>
+            <a:fillRect/>
+          </a:stretch>
+        </p:blipFill>
+        <p:spPr bwMode="auto">
+          <a:xfrm>
+            <a:off x="6040513" y="4255806"/>
+            <a:ext cx="1729020" cy="2317622"/>
+          </a:xfrm>
+          <a:prstGeom prst="rect">
+            <a:avLst/>
+          </a:prstGeom>
+          <a:noFill/>
+          <a:extLst>
+            <a:ext uri="{909E8E84-426E-40DD-AFC4-6F175D3DCCD1}">
+              <a14:hiddenFill xmlns:a14="http://schemas.microsoft.com/office/drawing/2010/main">
+                <a:solidFill>
+                  <a:srgbClr val="FFFFFF"/>
+                </a:solidFill>
+              </a14:hiddenFill>
+            </a:ext>
+          </a:extLst>
+        </p:spPr>
+      </p:pic>
     </p:spTree>
     <p:extLst>
       <p:ext uri="{BB962C8B-B14F-4D97-AF65-F5344CB8AC3E}">
-        <p14:creationId xmlns:p14="http://schemas.microsoft.com/office/powerpoint/2010/main" val="2455233009"/>
+        <p14:creationId xmlns:p14="http://schemas.microsoft.com/office/powerpoint/2010/main" val="659714967"/>
       </p:ext>
     </p:extLst>
   </p:cSld>
@@ -7159,7 +7958,7 @@
             <a:pPr algn="ctr"/>
             <a:r>
               <a:rPr lang="en-US" dirty="0"/>
-              <a:t>Concluding Comments</a:t>
+              <a:t>Interpretive Methods: what’s really happening?</a:t>
             </a:r>
             <a:endParaRPr lang="ru-RU" dirty="0"/>
           </a:p>
@@ -7167,30 +7966,22 @@
       </p:sp>
       <p:pic>
         <p:nvPicPr>
-          <p:cNvPr id="4" name="Content Placeholder 4"/>
+          <p:cNvPr id="4" name="Рисунок 3"/>
           <p:cNvPicPr>
-            <a:picLocks noGrp="1" noChangeAspect="1"/>
+            <a:picLocks noChangeAspect="1"/>
           </p:cNvPicPr>
-          <p:nvPr>
-            <p:ph sz="half" idx="4294967295"/>
-          </p:nvPr>
+          <p:nvPr/>
         </p:nvPicPr>
         <p:blipFill>
-          <a:blip r:embed="rId2">
-            <a:extLst>
-              <a:ext uri="{28A0092B-C50C-407E-A947-70E740481C1C}">
-                <a14:useLocalDpi xmlns:a14="http://schemas.microsoft.com/office/drawing/2010/main" val="0"/>
-              </a:ext>
-            </a:extLst>
-          </a:blip>
+          <a:blip r:embed="rId2"/>
           <a:stretch>
             <a:fillRect/>
           </a:stretch>
         </p:blipFill>
         <p:spPr>
           <a:xfrm>
-            <a:off x="3089520" y="2132148"/>
-            <a:ext cx="3886200" cy="2914651"/>
+            <a:off x="1256974" y="2105929"/>
+            <a:ext cx="7437387" cy="4265685"/>
           </a:xfrm>
           <a:prstGeom prst="rect">
             <a:avLst/>
@@ -7200,7 +7991,7 @@
     </p:spTree>
     <p:extLst>
       <p:ext uri="{BB962C8B-B14F-4D97-AF65-F5344CB8AC3E}">
-        <p14:creationId xmlns:p14="http://schemas.microsoft.com/office/powerpoint/2010/main" val="633993582"/>
+        <p14:creationId xmlns:p14="http://schemas.microsoft.com/office/powerpoint/2010/main" val="3772926769"/>
       </p:ext>
     </p:extLst>
   </p:cSld>
@@ -7468,7 +8259,7 @@
   <a:extraClrSchemeLst/>
   <a:extLst>
     <a:ext uri="{05A4C25C-085E-4340-85A3-A5531E510DB2}">
-      <thm15:themeFamily xmlns:thm15="http://schemas.microsoft.com/office/thememl/2012/main" name="Facet" id="{C0C680CD-088A-49FC-A102-D699147F32B2}" vid="{CFBC31BA-B70F-4F30-BCAA-4F3011E16C4D}"/>
+      <thm15:themeFamily xmlns:thm15="http://schemas.microsoft.com/office/thememl/2012/main" xmlns="" name="Facet" id="{C0C680CD-088A-49FC-A102-D699147F32B2}" vid="{CFBC31BA-B70F-4F30-BCAA-4F3011E16C4D}"/>
     </a:ext>
   </a:extLst>
 </a:theme>

</xml_diff>

<commit_message>
foresight in my work (1.4 v)
</commit_message>
<xml_diff>
--- a/Foresight_in_work/Foresight_methodologies.pptx
+++ b/Foresight_in_work/Foresight_methodologies.pptx
@@ -119,7 +119,7 @@
   </p:defaultTextStyle>
   <p:extLst>
     <p:ext uri="{EFAFB233-063F-42B5-8137-9DF3F51BA10A}">
-      <p15:sldGuideLst xmlns:p15="http://schemas.microsoft.com/office/powerpoint/2012/main" xmlns="">
+      <p15:sldGuideLst xmlns="" xmlns:p15="http://schemas.microsoft.com/office/powerpoint/2012/main">
         <p15:guide id="1" orient="horz" pos="2160">
           <p15:clr>
             <a:srgbClr val="A4A3A4"/>
@@ -858,7 +858,7 @@
           <a:p>
             <a:fld id="{252F7152-2E34-4CF8-96E1-9C0B6BE1AFF1}" type="datetimeFigureOut">
               <a:rPr lang="ru-RU" smtClean="0"/>
-              <a:t>15.04.2015</a:t>
+              <a:t>16.04.2015</a:t>
             </a:fld>
             <a:endParaRPr lang="ru-RU"/>
           </a:p>
@@ -1109,7 +1109,7 @@
           <a:p>
             <a:fld id="{252F7152-2E34-4CF8-96E1-9C0B6BE1AFF1}" type="datetimeFigureOut">
               <a:rPr lang="ru-RU" smtClean="0"/>
-              <a:t>15.04.2015</a:t>
+              <a:t>16.04.2015</a:t>
             </a:fld>
             <a:endParaRPr lang="ru-RU"/>
           </a:p>
@@ -1423,7 +1423,7 @@
           <a:p>
             <a:fld id="{252F7152-2E34-4CF8-96E1-9C0B6BE1AFF1}" type="datetimeFigureOut">
               <a:rPr lang="ru-RU" smtClean="0"/>
-              <a:t>15.04.2015</a:t>
+              <a:t>16.04.2015</a:t>
             </a:fld>
             <a:endParaRPr lang="ru-RU"/>
           </a:p>
@@ -1764,7 +1764,7 @@
           <a:p>
             <a:fld id="{252F7152-2E34-4CF8-96E1-9C0B6BE1AFF1}" type="datetimeFigureOut">
               <a:rPr lang="ru-RU" smtClean="0"/>
-              <a:t>15.04.2015</a:t>
+              <a:t>16.04.2015</a:t>
             </a:fld>
             <a:endParaRPr lang="ru-RU"/>
           </a:p>
@@ -2078,7 +2078,7 @@
           <a:p>
             <a:fld id="{252F7152-2E34-4CF8-96E1-9C0B6BE1AFF1}" type="datetimeFigureOut">
               <a:rPr lang="ru-RU" smtClean="0"/>
-              <a:t>15.04.2015</a:t>
+              <a:t>16.04.2015</a:t>
             </a:fld>
             <a:endParaRPr lang="ru-RU"/>
           </a:p>
@@ -2471,7 +2471,7 @@
           <a:p>
             <a:fld id="{252F7152-2E34-4CF8-96E1-9C0B6BE1AFF1}" type="datetimeFigureOut">
               <a:rPr lang="ru-RU" smtClean="0"/>
-              <a:t>15.04.2015</a:t>
+              <a:t>16.04.2015</a:t>
             </a:fld>
             <a:endParaRPr lang="ru-RU"/>
           </a:p>
@@ -2641,7 +2641,7 @@
           <a:p>
             <a:fld id="{252F7152-2E34-4CF8-96E1-9C0B6BE1AFF1}" type="datetimeFigureOut">
               <a:rPr lang="ru-RU" smtClean="0"/>
-              <a:t>15.04.2015</a:t>
+              <a:t>16.04.2015</a:t>
             </a:fld>
             <a:endParaRPr lang="ru-RU"/>
           </a:p>
@@ -2821,7 +2821,7 @@
           <a:p>
             <a:fld id="{252F7152-2E34-4CF8-96E1-9C0B6BE1AFF1}" type="datetimeFigureOut">
               <a:rPr lang="ru-RU" smtClean="0"/>
-              <a:t>15.04.2015</a:t>
+              <a:t>16.04.2015</a:t>
             </a:fld>
             <a:endParaRPr lang="ru-RU"/>
           </a:p>
@@ -2997,7 +2997,7 @@
           <a:p>
             <a:fld id="{252F7152-2E34-4CF8-96E1-9C0B6BE1AFF1}" type="datetimeFigureOut">
               <a:rPr lang="ru-RU" smtClean="0"/>
-              <a:t>15.04.2015</a:t>
+              <a:t>16.04.2015</a:t>
             </a:fld>
             <a:endParaRPr lang="ru-RU"/>
           </a:p>
@@ -3244,7 +3244,7 @@
           <a:p>
             <a:fld id="{252F7152-2E34-4CF8-96E1-9C0B6BE1AFF1}" type="datetimeFigureOut">
               <a:rPr lang="ru-RU" smtClean="0"/>
-              <a:t>15.04.2015</a:t>
+              <a:t>16.04.2015</a:t>
             </a:fld>
             <a:endParaRPr lang="ru-RU"/>
           </a:p>
@@ -3476,7 +3476,7 @@
           <a:p>
             <a:fld id="{252F7152-2E34-4CF8-96E1-9C0B6BE1AFF1}" type="datetimeFigureOut">
               <a:rPr lang="ru-RU" smtClean="0"/>
-              <a:t>15.04.2015</a:t>
+              <a:t>16.04.2015</a:t>
             </a:fld>
             <a:endParaRPr lang="ru-RU"/>
           </a:p>
@@ -3850,7 +3850,7 @@
           <a:p>
             <a:fld id="{252F7152-2E34-4CF8-96E1-9C0B6BE1AFF1}" type="datetimeFigureOut">
               <a:rPr lang="ru-RU" smtClean="0"/>
-              <a:t>15.04.2015</a:t>
+              <a:t>16.04.2015</a:t>
             </a:fld>
             <a:endParaRPr lang="ru-RU"/>
           </a:p>
@@ -3973,7 +3973,7 @@
           <a:p>
             <a:fld id="{252F7152-2E34-4CF8-96E1-9C0B6BE1AFF1}" type="datetimeFigureOut">
               <a:rPr lang="ru-RU" smtClean="0"/>
-              <a:t>15.04.2015</a:t>
+              <a:t>16.04.2015</a:t>
             </a:fld>
             <a:endParaRPr lang="ru-RU"/>
           </a:p>
@@ -4068,7 +4068,7 @@
           <a:p>
             <a:fld id="{252F7152-2E34-4CF8-96E1-9C0B6BE1AFF1}" type="datetimeFigureOut">
               <a:rPr lang="ru-RU" smtClean="0"/>
-              <a:t>15.04.2015</a:t>
+              <a:t>16.04.2015</a:t>
             </a:fld>
             <a:endParaRPr lang="ru-RU"/>
           </a:p>
@@ -4323,7 +4323,7 @@
           <a:p>
             <a:fld id="{252F7152-2E34-4CF8-96E1-9C0B6BE1AFF1}" type="datetimeFigureOut">
               <a:rPr lang="ru-RU" smtClean="0"/>
-              <a:t>15.04.2015</a:t>
+              <a:t>16.04.2015</a:t>
             </a:fld>
             <a:endParaRPr lang="ru-RU"/>
           </a:p>
@@ -4586,7 +4586,7 @@
           <a:p>
             <a:fld id="{252F7152-2E34-4CF8-96E1-9C0B6BE1AFF1}" type="datetimeFigureOut">
               <a:rPr lang="ru-RU" smtClean="0"/>
-              <a:t>15.04.2015</a:t>
+              <a:t>16.04.2015</a:t>
             </a:fld>
             <a:endParaRPr lang="ru-RU"/>
           </a:p>
@@ -5329,7 +5329,7 @@
           <a:p>
             <a:fld id="{252F7152-2E34-4CF8-96E1-9C0B6BE1AFF1}" type="datetimeFigureOut">
               <a:rPr lang="ru-RU" smtClean="0"/>
-              <a:t>15.04.2015</a:t>
+              <a:t>16.04.2015</a:t>
             </a:fld>
             <a:endParaRPr lang="ru-RU"/>
           </a:p>
@@ -8259,7 +8259,7 @@
   <a:extraClrSchemeLst/>
   <a:extLst>
     <a:ext uri="{05A4C25C-085E-4340-85A3-A5531E510DB2}">
-      <thm15:themeFamily xmlns:thm15="http://schemas.microsoft.com/office/thememl/2012/main" xmlns="" name="Facet" id="{C0C680CD-088A-49FC-A102-D699147F32B2}" vid="{CFBC31BA-B70F-4F30-BCAA-4F3011E16C4D}"/>
+      <thm15:themeFamily xmlns="" xmlns:thm15="http://schemas.microsoft.com/office/thememl/2012/main" name="Facet" id="{C0C680CD-088A-49FC-A102-D699147F32B2}" vid="{CFBC31BA-B70F-4F30-BCAA-4F3011E16C4D}"/>
     </a:ext>
   </a:extLst>
 </a:theme>

</xml_diff>

<commit_message>
Our laboratory (1.0 v)
</commit_message>
<xml_diff>
--- a/Foresight_in_work/Foresight_methodologies.pptx
+++ b/Foresight_in_work/Foresight_methodologies.pptx
@@ -119,7 +119,7 @@
   </p:defaultTextStyle>
   <p:extLst>
     <p:ext uri="{EFAFB233-063F-42B5-8137-9DF3F51BA10A}">
-      <p15:sldGuideLst xmlns="" xmlns:p15="http://schemas.microsoft.com/office/powerpoint/2012/main">
+      <p15:sldGuideLst xmlns:p15="http://schemas.microsoft.com/office/powerpoint/2012/main" xmlns="">
         <p15:guide id="1" orient="horz" pos="2160">
           <p15:clr>
             <a:srgbClr val="A4A3A4"/>
@@ -8259,7 +8259,7 @@
   <a:extraClrSchemeLst/>
   <a:extLst>
     <a:ext uri="{05A4C25C-085E-4340-85A3-A5531E510DB2}">
-      <thm15:themeFamily xmlns="" xmlns:thm15="http://schemas.microsoft.com/office/thememl/2012/main" name="Facet" id="{C0C680CD-088A-49FC-A102-D699147F32B2}" vid="{CFBC31BA-B70F-4F30-BCAA-4F3011E16C4D}"/>
+      <thm15:themeFamily xmlns:thm15="http://schemas.microsoft.com/office/thememl/2012/main" xmlns="" name="Facet" id="{C0C680CD-088A-49FC-A102-D699147F32B2}" vid="{CFBC31BA-B70F-4F30-BCAA-4F3011E16C4D}"/>
     </a:ext>
   </a:extLst>
 </a:theme>

</xml_diff>